<commit_message>
Add lecture on network control plane
</commit_message>
<xml_diff>
--- a/ex/552-S24/staging/552-S24/lectures/11-network-software-data-plane.pptx
+++ b/ex/552-S24/staging/552-S24/lectures/11-network-software-data-plane.pptx
@@ -5,7 +5,7 @@
     <p:sldMasterId id="2147483648" r:id="rId1"/>
   </p:sldMasterIdLst>
   <p:notesMasterIdLst>
-    <p:notesMasterId r:id="rId28"/>
+    <p:notesMasterId r:id="rId20"/>
   </p:notesMasterIdLst>
   <p:sldIdLst>
     <p:sldId id="421" r:id="rId2"/>
@@ -26,14 +26,6 @@
     <p:sldId id="364" r:id="rId17"/>
     <p:sldId id="423" r:id="rId18"/>
     <p:sldId id="425" r:id="rId19"/>
-    <p:sldId id="424" r:id="rId20"/>
-    <p:sldId id="373" r:id="rId21"/>
-    <p:sldId id="375" r:id="rId22"/>
-    <p:sldId id="376" r:id="rId23"/>
-    <p:sldId id="377" r:id="rId24"/>
-    <p:sldId id="378" r:id="rId25"/>
-    <p:sldId id="861" r:id="rId26"/>
-    <p:sldId id="2054" r:id="rId27"/>
   </p:sldIdLst>
   <p:sldSz cx="12192000" cy="6858000"/>
   <p:notesSz cx="6858000" cy="9144000"/>
@@ -222,7 +214,7 @@
           <a:p>
             <a:fld id="{4F542666-03D5-5341-A833-B4D3FAA577B7}" type="datetimeFigureOut">
               <a:rPr lang="en-US" smtClean="0"/>
-              <a:t>4/3/24</a:t>
+              <a:t>4/10/24</a:t>
             </a:fld>
             <a:endParaRPr lang="en-US"/>
           </a:p>
@@ -825,7 +817,7 @@
           <a:p>
             <a:fld id="{DCCCB3B3-0381-6043-97A3-E72CD5022D9A}" type="datetimeFigureOut">
               <a:rPr lang="en-US" smtClean="0"/>
-              <a:t>4/3/24</a:t>
+              <a:t>4/10/24</a:t>
             </a:fld>
             <a:endParaRPr lang="en-US"/>
           </a:p>
@@ -993,7 +985,7 @@
           <a:p>
             <a:fld id="{DCCCB3B3-0381-6043-97A3-E72CD5022D9A}" type="datetimeFigureOut">
               <a:rPr lang="en-US" smtClean="0"/>
-              <a:t>4/3/24</a:t>
+              <a:t>4/10/24</a:t>
             </a:fld>
             <a:endParaRPr lang="en-US"/>
           </a:p>
@@ -1171,7 +1163,7 @@
           <a:p>
             <a:fld id="{DCCCB3B3-0381-6043-97A3-E72CD5022D9A}" type="datetimeFigureOut">
               <a:rPr lang="en-US" smtClean="0"/>
-              <a:t>4/3/24</a:t>
+              <a:t>4/10/24</a:t>
             </a:fld>
             <a:endParaRPr lang="en-US"/>
           </a:p>
@@ -1339,7 +1331,7 @@
           <a:p>
             <a:fld id="{DCCCB3B3-0381-6043-97A3-E72CD5022D9A}" type="datetimeFigureOut">
               <a:rPr lang="en-US" smtClean="0"/>
-              <a:t>4/3/24</a:t>
+              <a:t>4/10/24</a:t>
             </a:fld>
             <a:endParaRPr lang="en-US"/>
           </a:p>
@@ -1584,7 +1576,7 @@
           <a:p>
             <a:fld id="{DCCCB3B3-0381-6043-97A3-E72CD5022D9A}" type="datetimeFigureOut">
               <a:rPr lang="en-US" smtClean="0"/>
-              <a:t>4/3/24</a:t>
+              <a:t>4/10/24</a:t>
             </a:fld>
             <a:endParaRPr lang="en-US"/>
           </a:p>
@@ -1813,7 +1805,7 @@
           <a:p>
             <a:fld id="{DCCCB3B3-0381-6043-97A3-E72CD5022D9A}" type="datetimeFigureOut">
               <a:rPr lang="en-US" smtClean="0"/>
-              <a:t>4/3/24</a:t>
+              <a:t>4/10/24</a:t>
             </a:fld>
             <a:endParaRPr lang="en-US"/>
           </a:p>
@@ -2177,7 +2169,7 @@
           <a:p>
             <a:fld id="{DCCCB3B3-0381-6043-97A3-E72CD5022D9A}" type="datetimeFigureOut">
               <a:rPr lang="en-US" smtClean="0"/>
-              <a:t>4/3/24</a:t>
+              <a:t>4/10/24</a:t>
             </a:fld>
             <a:endParaRPr lang="en-US"/>
           </a:p>
@@ -2294,7 +2286,7 @@
           <a:p>
             <a:fld id="{DCCCB3B3-0381-6043-97A3-E72CD5022D9A}" type="datetimeFigureOut">
               <a:rPr lang="en-US" smtClean="0"/>
-              <a:t>4/3/24</a:t>
+              <a:t>4/10/24</a:t>
             </a:fld>
             <a:endParaRPr lang="en-US"/>
           </a:p>
@@ -2389,7 +2381,7 @@
           <a:p>
             <a:fld id="{DCCCB3B3-0381-6043-97A3-E72CD5022D9A}" type="datetimeFigureOut">
               <a:rPr lang="en-US" smtClean="0"/>
-              <a:t>4/3/24</a:t>
+              <a:t>4/10/24</a:t>
             </a:fld>
             <a:endParaRPr lang="en-US"/>
           </a:p>
@@ -2664,7 +2656,7 @@
           <a:p>
             <a:fld id="{DCCCB3B3-0381-6043-97A3-E72CD5022D9A}" type="datetimeFigureOut">
               <a:rPr lang="en-US" smtClean="0"/>
-              <a:t>4/3/24</a:t>
+              <a:t>4/10/24</a:t>
             </a:fld>
             <a:endParaRPr lang="en-US"/>
           </a:p>
@@ -2916,7 +2908,7 @@
           <a:p>
             <a:fld id="{DCCCB3B3-0381-6043-97A3-E72CD5022D9A}" type="datetimeFigureOut">
               <a:rPr lang="en-US" smtClean="0"/>
-              <a:t>4/3/24</a:t>
+              <a:t>4/10/24</a:t>
             </a:fld>
             <a:endParaRPr lang="en-US"/>
           </a:p>
@@ -3127,7 +3119,7 @@
           <a:p>
             <a:fld id="{DCCCB3B3-0381-6043-97A3-E72CD5022D9A}" type="datetimeFigureOut">
               <a:rPr lang="en-US" smtClean="0"/>
-              <a:t>4/3/24</a:t>
+              <a:t>4/10/24</a:t>
             </a:fld>
             <a:endParaRPr lang="en-US"/>
           </a:p>
@@ -7439,426 +7431,6 @@
 </p:sld>
 </file>
 
-<file path=ppt/slides/slide19.xml><?xml version="1.0" encoding="utf-8"?>
-<p:sld xmlns:a="http://schemas.openxmlformats.org/drawingml/2006/main" xmlns:r="http://schemas.openxmlformats.org/officeDocument/2006/relationships" xmlns:p="http://schemas.openxmlformats.org/presentationml/2006/main">
-  <p:cSld>
-    <p:spTree>
-      <p:nvGrpSpPr>
-        <p:cNvPr id="1" name=""/>
-        <p:cNvGrpSpPr/>
-        <p:nvPr/>
-      </p:nvGrpSpPr>
-      <p:grpSpPr>
-        <a:xfrm>
-          <a:off x="0" y="0"/>
-          <a:ext cx="0" cy="0"/>
-          <a:chOff x="0" y="0"/>
-          <a:chExt cx="0" cy="0"/>
-        </a:xfrm>
-      </p:grpSpPr>
-      <p:sp>
-        <p:nvSpPr>
-          <p:cNvPr id="2" name="Title 1">
-            <a:extLst>
-              <a:ext uri="{FF2B5EF4-FFF2-40B4-BE49-F238E27FC236}">
-                <a16:creationId xmlns:a16="http://schemas.microsoft.com/office/drawing/2014/main" id="{89026664-6E86-3A42-BE6D-AE347090BD3C}"/>
-              </a:ext>
-            </a:extLst>
-          </p:cNvPr>
-          <p:cNvSpPr>
-            <a:spLocks noGrp="1"/>
-          </p:cNvSpPr>
-          <p:nvPr>
-            <p:ph type="title"/>
-          </p:nvPr>
-        </p:nvSpPr>
-        <p:spPr/>
-        <p:txBody>
-          <a:bodyPr/>
-          <a:lstStyle/>
-          <a:p>
-            <a:r>
-              <a:rPr lang="en-US" dirty="0" err="1"/>
-              <a:t>OpenVSwitch</a:t>
-            </a:r>
-            <a:r>
-              <a:rPr lang="en-US" dirty="0"/>
-              <a:t>: Requirements</a:t>
-            </a:r>
-          </a:p>
-        </p:txBody>
-      </p:sp>
-      <p:sp>
-        <p:nvSpPr>
-          <p:cNvPr id="3" name="Content Placeholder 2">
-            <a:extLst>
-              <a:ext uri="{FF2B5EF4-FFF2-40B4-BE49-F238E27FC236}">
-                <a16:creationId xmlns:a16="http://schemas.microsoft.com/office/drawing/2014/main" id="{219CCF18-82FE-074C-9915-E9F4ED0B450E}"/>
-              </a:ext>
-            </a:extLst>
-          </p:cNvPr>
-          <p:cNvSpPr>
-            <a:spLocks noGrp="1"/>
-          </p:cNvSpPr>
-          <p:nvPr>
-            <p:ph idx="1"/>
-          </p:nvPr>
-        </p:nvSpPr>
-        <p:spPr>
-          <a:xfrm>
-            <a:off x="838200" y="1825625"/>
-            <a:ext cx="10515600" cy="4861778"/>
-          </a:xfrm>
-        </p:spPr>
-        <p:txBody>
-          <a:bodyPr>
-            <a:normAutofit/>
-          </a:bodyPr>
-          <a:lstStyle/>
-          <a:p>
-            <a:r>
-              <a:rPr lang="en-US" dirty="0"/>
-              <a:t>Support large and complex policies</a:t>
-            </a:r>
-          </a:p>
-          <a:p>
-            <a:endParaRPr lang="en-US" dirty="0"/>
-          </a:p>
-          <a:p>
-            <a:r>
-              <a:rPr lang="en-US" dirty="0"/>
-              <a:t>Support </a:t>
-            </a:r>
-            <a:r>
-              <a:rPr lang="en-US" dirty="0">
-                <a:solidFill>
-                  <a:srgbClr val="C00000"/>
-                </a:solidFill>
-              </a:rPr>
-              <a:t>updates </a:t>
-            </a:r>
-            <a:r>
-              <a:rPr lang="en-US" dirty="0"/>
-              <a:t>in such policies, e.g., VM migration, new customers, …</a:t>
-            </a:r>
-          </a:p>
-          <a:p>
-            <a:pPr lvl="1"/>
-            <a:endParaRPr lang="en-US" dirty="0"/>
-          </a:p>
-          <a:p>
-            <a:r>
-              <a:rPr lang="en-US" dirty="0"/>
-              <a:t>Don’t take up too much resources (CPU must do useful work, not just policy processing)</a:t>
-            </a:r>
-          </a:p>
-          <a:p>
-            <a:pPr lvl="1"/>
-            <a:endParaRPr lang="en-US" dirty="0"/>
-          </a:p>
-          <a:p>
-            <a:r>
-              <a:rPr lang="en-US" dirty="0"/>
-              <a:t>Process packets with high performance</a:t>
-            </a:r>
-          </a:p>
-          <a:p>
-            <a:pPr lvl="1"/>
-            <a:r>
-              <a:rPr lang="en-US" dirty="0"/>
-              <a:t>High throughput and low delay</a:t>
-            </a:r>
-          </a:p>
-        </p:txBody>
-      </p:sp>
-    </p:spTree>
-    <p:extLst>
-      <p:ext uri="{BB962C8B-B14F-4D97-AF65-F5344CB8AC3E}">
-        <p14:creationId xmlns:p14="http://schemas.microsoft.com/office/powerpoint/2010/main" val="1600301325"/>
-      </p:ext>
-    </p:extLst>
-  </p:cSld>
-  <p:clrMapOvr>
-    <a:masterClrMapping/>
-  </p:clrMapOvr>
-  <p:timing>
-    <p:tnLst>
-      <p:par>
-        <p:cTn id="1" dur="indefinite" restart="never" nodeType="tmRoot">
-          <p:childTnLst>
-            <p:seq concurrent="1" nextAc="seek">
-              <p:cTn id="2" dur="indefinite" nodeType="mainSeq">
-                <p:childTnLst>
-                  <p:par>
-                    <p:cTn id="3" fill="hold">
-                      <p:stCondLst>
-                        <p:cond delay="indefinite"/>
-                      </p:stCondLst>
-                      <p:childTnLst>
-                        <p:par>
-                          <p:cTn id="4" fill="hold">
-                            <p:stCondLst>
-                              <p:cond delay="0"/>
-                            </p:stCondLst>
-                            <p:childTnLst>
-                              <p:par>
-                                <p:cTn id="5" presetID="1" presetClass="entr" presetSubtype="0" fill="hold" nodeType="clickEffect">
-                                  <p:stCondLst>
-                                    <p:cond delay="0"/>
-                                  </p:stCondLst>
-                                  <p:childTnLst>
-                                    <p:set>
-                                      <p:cBhvr>
-                                        <p:cTn id="6" dur="1" fill="hold">
-                                          <p:stCondLst>
-                                            <p:cond delay="0"/>
-                                          </p:stCondLst>
-                                        </p:cTn>
-                                        <p:tgtEl>
-                                          <p:spTgt spid="3">
-                                            <p:txEl>
-                                              <p:pRg st="0" end="0"/>
-                                            </p:txEl>
-                                          </p:spTgt>
-                                        </p:tgtEl>
-                                        <p:attrNameLst>
-                                          <p:attrName>style.visibility</p:attrName>
-                                        </p:attrNameLst>
-                                      </p:cBhvr>
-                                      <p:to>
-                                        <p:strVal val="visible"/>
-                                      </p:to>
-                                    </p:set>
-                                  </p:childTnLst>
-                                </p:cTn>
-                              </p:par>
-                            </p:childTnLst>
-                          </p:cTn>
-                        </p:par>
-                      </p:childTnLst>
-                    </p:cTn>
-                  </p:par>
-                  <p:par>
-                    <p:cTn id="7" fill="hold">
-                      <p:stCondLst>
-                        <p:cond delay="indefinite"/>
-                      </p:stCondLst>
-                      <p:childTnLst>
-                        <p:par>
-                          <p:cTn id="8" fill="hold">
-                            <p:stCondLst>
-                              <p:cond delay="0"/>
-                            </p:stCondLst>
-                            <p:childTnLst>
-                              <p:par>
-                                <p:cTn id="9" presetID="1" presetClass="entr" presetSubtype="0" fill="hold" nodeType="clickEffect">
-                                  <p:stCondLst>
-                                    <p:cond delay="0"/>
-                                  </p:stCondLst>
-                                  <p:childTnLst>
-                                    <p:set>
-                                      <p:cBhvr>
-                                        <p:cTn id="10" dur="1" fill="hold">
-                                          <p:stCondLst>
-                                            <p:cond delay="0"/>
-                                          </p:stCondLst>
-                                        </p:cTn>
-                                        <p:tgtEl>
-                                          <p:spTgt spid="3">
-                                            <p:txEl>
-                                              <p:pRg st="2" end="2"/>
-                                            </p:txEl>
-                                          </p:spTgt>
-                                        </p:tgtEl>
-                                        <p:attrNameLst>
-                                          <p:attrName>style.visibility</p:attrName>
-                                        </p:attrNameLst>
-                                      </p:cBhvr>
-                                      <p:to>
-                                        <p:strVal val="visible"/>
-                                      </p:to>
-                                    </p:set>
-                                  </p:childTnLst>
-                                </p:cTn>
-                              </p:par>
-                            </p:childTnLst>
-                          </p:cTn>
-                        </p:par>
-                      </p:childTnLst>
-                    </p:cTn>
-                  </p:par>
-                  <p:par>
-                    <p:cTn id="11" fill="hold">
-                      <p:stCondLst>
-                        <p:cond delay="indefinite"/>
-                      </p:stCondLst>
-                      <p:childTnLst>
-                        <p:par>
-                          <p:cTn id="12" fill="hold">
-                            <p:stCondLst>
-                              <p:cond delay="0"/>
-                            </p:stCondLst>
-                            <p:childTnLst>
-                              <p:par>
-                                <p:cTn id="13" presetID="1" presetClass="entr" presetSubtype="0" fill="hold" nodeType="clickEffect">
-                                  <p:stCondLst>
-                                    <p:cond delay="0"/>
-                                  </p:stCondLst>
-                                  <p:childTnLst>
-                                    <p:set>
-                                      <p:cBhvr>
-                                        <p:cTn id="14" dur="1" fill="hold">
-                                          <p:stCondLst>
-                                            <p:cond delay="0"/>
-                                          </p:stCondLst>
-                                        </p:cTn>
-                                        <p:tgtEl>
-                                          <p:spTgt spid="3">
-                                            <p:txEl>
-                                              <p:pRg st="4" end="4"/>
-                                            </p:txEl>
-                                          </p:spTgt>
-                                        </p:tgtEl>
-                                        <p:attrNameLst>
-                                          <p:attrName>style.visibility</p:attrName>
-                                        </p:attrNameLst>
-                                      </p:cBhvr>
-                                      <p:to>
-                                        <p:strVal val="visible"/>
-                                      </p:to>
-                                    </p:set>
-                                  </p:childTnLst>
-                                </p:cTn>
-                              </p:par>
-                            </p:childTnLst>
-                          </p:cTn>
-                        </p:par>
-                      </p:childTnLst>
-                    </p:cTn>
-                  </p:par>
-                  <p:par>
-                    <p:cTn id="15" fill="hold">
-                      <p:stCondLst>
-                        <p:cond delay="indefinite"/>
-                      </p:stCondLst>
-                      <p:childTnLst>
-                        <p:par>
-                          <p:cTn id="16" fill="hold">
-                            <p:stCondLst>
-                              <p:cond delay="0"/>
-                            </p:stCondLst>
-                            <p:childTnLst>
-                              <p:par>
-                                <p:cTn id="17" presetID="1" presetClass="entr" presetSubtype="0" fill="hold" nodeType="clickEffect">
-                                  <p:stCondLst>
-                                    <p:cond delay="0"/>
-                                  </p:stCondLst>
-                                  <p:childTnLst>
-                                    <p:set>
-                                      <p:cBhvr>
-                                        <p:cTn id="18" dur="1" fill="hold">
-                                          <p:stCondLst>
-                                            <p:cond delay="0"/>
-                                          </p:stCondLst>
-                                        </p:cTn>
-                                        <p:tgtEl>
-                                          <p:spTgt spid="3">
-                                            <p:txEl>
-                                              <p:pRg st="6" end="6"/>
-                                            </p:txEl>
-                                          </p:spTgt>
-                                        </p:tgtEl>
-                                        <p:attrNameLst>
-                                          <p:attrName>style.visibility</p:attrName>
-                                        </p:attrNameLst>
-                                      </p:cBhvr>
-                                      <p:to>
-                                        <p:strVal val="visible"/>
-                                      </p:to>
-                                    </p:set>
-                                  </p:childTnLst>
-                                </p:cTn>
-                              </p:par>
-                            </p:childTnLst>
-                          </p:cTn>
-                        </p:par>
-                      </p:childTnLst>
-                    </p:cTn>
-                  </p:par>
-                  <p:par>
-                    <p:cTn id="19" fill="hold">
-                      <p:stCondLst>
-                        <p:cond delay="indefinite"/>
-                      </p:stCondLst>
-                      <p:childTnLst>
-                        <p:par>
-                          <p:cTn id="20" fill="hold">
-                            <p:stCondLst>
-                              <p:cond delay="0"/>
-                            </p:stCondLst>
-                            <p:childTnLst>
-                              <p:par>
-                                <p:cTn id="21" presetID="1" presetClass="entr" presetSubtype="0" fill="hold" nodeType="clickEffect">
-                                  <p:stCondLst>
-                                    <p:cond delay="0"/>
-                                  </p:stCondLst>
-                                  <p:childTnLst>
-                                    <p:set>
-                                      <p:cBhvr>
-                                        <p:cTn id="22" dur="1" fill="hold">
-                                          <p:stCondLst>
-                                            <p:cond delay="0"/>
-                                          </p:stCondLst>
-                                        </p:cTn>
-                                        <p:tgtEl>
-                                          <p:spTgt spid="3">
-                                            <p:txEl>
-                                              <p:pRg st="7" end="7"/>
-                                            </p:txEl>
-                                          </p:spTgt>
-                                        </p:tgtEl>
-                                        <p:attrNameLst>
-                                          <p:attrName>style.visibility</p:attrName>
-                                        </p:attrNameLst>
-                                      </p:cBhvr>
-                                      <p:to>
-                                        <p:strVal val="visible"/>
-                                      </p:to>
-                                    </p:set>
-                                  </p:childTnLst>
-                                </p:cTn>
-                              </p:par>
-                            </p:childTnLst>
-                          </p:cTn>
-                        </p:par>
-                      </p:childTnLst>
-                    </p:cTn>
-                  </p:par>
-                </p:childTnLst>
-              </p:cTn>
-              <p:prevCondLst>
-                <p:cond evt="onPrev" delay="0">
-                  <p:tgtEl>
-                    <p:sldTgt/>
-                  </p:tgtEl>
-                </p:cond>
-              </p:prevCondLst>
-              <p:nextCondLst>
-                <p:cond evt="onNext" delay="0">
-                  <p:tgtEl>
-                    <p:sldTgt/>
-                  </p:tgtEl>
-                </p:cond>
-              </p:nextCondLst>
-            </p:seq>
-          </p:childTnLst>
-        </p:cTn>
-      </p:par>
-    </p:tnLst>
-  </p:timing>
-</p:sld>
-</file>
-
 <file path=ppt/slides/slide2.xml><?xml version="1.0" encoding="utf-8"?>
 <p:sld xmlns:a="http://schemas.openxmlformats.org/drawingml/2006/main" xmlns:r="http://schemas.openxmlformats.org/officeDocument/2006/relationships" xmlns:p="http://schemas.openxmlformats.org/presentationml/2006/main">
   <p:cSld>
@@ -8045,2897 +7617,6 @@
     <p:bldLst>
       <p:bldP spid="2" grpId="0"/>
     </p:bldLst>
-  </p:timing>
-</p:sld>
-</file>
-
-<file path=ppt/slides/slide20.xml><?xml version="1.0" encoding="utf-8"?>
-<p:sld xmlns:a="http://schemas.openxmlformats.org/drawingml/2006/main" xmlns:r="http://schemas.openxmlformats.org/officeDocument/2006/relationships" xmlns:p="http://schemas.openxmlformats.org/presentationml/2006/main">
-  <p:cSld>
-    <p:spTree>
-      <p:nvGrpSpPr>
-        <p:cNvPr id="1" name=""/>
-        <p:cNvGrpSpPr/>
-        <p:nvPr/>
-      </p:nvGrpSpPr>
-      <p:grpSpPr>
-        <a:xfrm>
-          <a:off x="0" y="0"/>
-          <a:ext cx="0" cy="0"/>
-          <a:chOff x="0" y="0"/>
-          <a:chExt cx="0" cy="0"/>
-        </a:xfrm>
-      </p:grpSpPr>
-      <p:sp>
-        <p:nvSpPr>
-          <p:cNvPr id="2" name="Title 1"/>
-          <p:cNvSpPr>
-            <a:spLocks noGrp="1"/>
-          </p:cNvSpPr>
-          <p:nvPr>
-            <p:ph type="title"/>
-          </p:nvPr>
-        </p:nvSpPr>
-        <p:spPr/>
-        <p:txBody>
-          <a:bodyPr/>
-          <a:lstStyle/>
-          <a:p>
-            <a:r>
-              <a:rPr lang="en-US" dirty="0"/>
-              <a:t>OVS design</a:t>
-            </a:r>
-          </a:p>
-        </p:txBody>
-      </p:sp>
-      <p:pic>
-        <p:nvPicPr>
-          <p:cNvPr id="4" name="Content Placeholder 3"/>
-          <p:cNvPicPr>
-            <a:picLocks noGrp="1" noChangeAspect="1"/>
-          </p:cNvPicPr>
-          <p:nvPr>
-            <p:ph idx="1"/>
-          </p:nvPr>
-        </p:nvPicPr>
-        <p:blipFill>
-          <a:blip r:embed="rId2">
-            <a:extLst>
-              <a:ext uri="{28A0092B-C50C-407E-A947-70E740481C1C}">
-                <a14:useLocalDpi xmlns:a14="http://schemas.microsoft.com/office/drawing/2010/main" val="0"/>
-              </a:ext>
-            </a:extLst>
-          </a:blip>
-          <a:stretch>
-            <a:fillRect/>
-          </a:stretch>
-        </p:blipFill>
-        <p:spPr>
-          <a:xfrm>
-            <a:off x="838200" y="1825625"/>
-            <a:ext cx="10072541" cy="4351338"/>
-          </a:xfrm>
-        </p:spPr>
-      </p:pic>
-    </p:spTree>
-    <p:extLst>
-      <p:ext uri="{BB962C8B-B14F-4D97-AF65-F5344CB8AC3E}">
-        <p14:creationId xmlns:p14="http://schemas.microsoft.com/office/powerpoint/2010/main" val="1529950534"/>
-      </p:ext>
-    </p:extLst>
-  </p:cSld>
-  <p:clrMapOvr>
-    <a:masterClrMapping/>
-  </p:clrMapOvr>
-</p:sld>
-</file>
-
-<file path=ppt/slides/slide21.xml><?xml version="1.0" encoding="utf-8"?>
-<p:sld xmlns:a="http://schemas.openxmlformats.org/drawingml/2006/main" xmlns:r="http://schemas.openxmlformats.org/officeDocument/2006/relationships" xmlns:p="http://schemas.openxmlformats.org/presentationml/2006/main">
-  <p:cSld>
-    <p:spTree>
-      <p:nvGrpSpPr>
-        <p:cNvPr id="1" name=""/>
-        <p:cNvGrpSpPr/>
-        <p:nvPr/>
-      </p:nvGrpSpPr>
-      <p:grpSpPr>
-        <a:xfrm>
-          <a:off x="0" y="0"/>
-          <a:ext cx="0" cy="0"/>
-          <a:chOff x="0" y="0"/>
-          <a:chExt cx="0" cy="0"/>
-        </a:xfrm>
-      </p:grpSpPr>
-      <p:sp>
-        <p:nvSpPr>
-          <p:cNvPr id="2" name="Title 1"/>
-          <p:cNvSpPr>
-            <a:spLocks noGrp="1"/>
-          </p:cNvSpPr>
-          <p:nvPr>
-            <p:ph type="title"/>
-          </p:nvPr>
-        </p:nvSpPr>
-        <p:spPr/>
-        <p:txBody>
-          <a:bodyPr/>
-          <a:lstStyle/>
-          <a:p>
-            <a:r>
-              <a:rPr lang="en-US" dirty="0"/>
-              <a:t>First design: put OF tables in the kernel</a:t>
-            </a:r>
-          </a:p>
-        </p:txBody>
-      </p:sp>
-      <p:pic>
-        <p:nvPicPr>
-          <p:cNvPr id="5" name="Picture 4"/>
-          <p:cNvPicPr>
-            <a:picLocks noChangeAspect="1"/>
-          </p:cNvPicPr>
-          <p:nvPr/>
-        </p:nvPicPr>
-        <p:blipFill>
-          <a:blip r:embed="rId2">
-            <a:extLst>
-              <a:ext uri="{28A0092B-C50C-407E-A947-70E740481C1C}">
-                <a14:useLocalDpi xmlns:a14="http://schemas.microsoft.com/office/drawing/2010/main" val="0"/>
-              </a:ext>
-            </a:extLst>
-          </a:blip>
-          <a:stretch>
-            <a:fillRect/>
-          </a:stretch>
-        </p:blipFill>
-        <p:spPr>
-          <a:xfrm>
-            <a:off x="912341" y="1406479"/>
-            <a:ext cx="10058400" cy="4011081"/>
-          </a:xfrm>
-          <a:prstGeom prst="rect">
-            <a:avLst/>
-          </a:prstGeom>
-        </p:spPr>
-      </p:pic>
-      <p:sp>
-        <p:nvSpPr>
-          <p:cNvPr id="6" name="TextBox 5"/>
-          <p:cNvSpPr txBox="1"/>
-          <p:nvPr/>
-        </p:nvSpPr>
-        <p:spPr>
-          <a:xfrm>
-            <a:off x="411663" y="5417560"/>
-            <a:ext cx="11368674" cy="1384995"/>
-          </a:xfrm>
-          <a:prstGeom prst="rect">
-            <a:avLst/>
-          </a:prstGeom>
-          <a:noFill/>
-        </p:spPr>
-        <p:txBody>
-          <a:bodyPr wrap="square" rtlCol="0">
-            <a:spAutoFit/>
-          </a:bodyPr>
-          <a:lstStyle/>
-          <a:p>
-            <a:r>
-              <a:rPr lang="en-US" sz="2800" dirty="0">
-                <a:solidFill>
-                  <a:srgbClr val="C00000"/>
-                </a:solidFill>
-                <a:latin typeface="Helvetica" charset="0"/>
-                <a:ea typeface="Helvetica" charset="0"/>
-                <a:cs typeface="Helvetica" charset="0"/>
-              </a:rPr>
-              <a:t>Large policies:</a:t>
-            </a:r>
-            <a:r>
-              <a:rPr lang="en-US" sz="2800" dirty="0">
-                <a:latin typeface="Helvetica" charset="0"/>
-                <a:ea typeface="Helvetica" charset="0"/>
-                <a:cs typeface="Helvetica" charset="0"/>
-              </a:rPr>
-              <a:t> Low performance with 100+ lookups per packet</a:t>
-            </a:r>
-          </a:p>
-          <a:p>
-            <a:r>
-              <a:rPr lang="en-US" sz="2800" dirty="0">
-                <a:latin typeface="Helvetica" charset="0"/>
-                <a:ea typeface="Helvetica" charset="0"/>
-                <a:cs typeface="Helvetica" charset="0"/>
-              </a:rPr>
-              <a:t>Merging policies is problematic: </a:t>
-            </a:r>
-            <a:r>
-              <a:rPr lang="en-US" sz="2800" dirty="0">
-                <a:solidFill>
-                  <a:srgbClr val="C00000"/>
-                </a:solidFill>
-                <a:latin typeface="Helvetica" charset="0"/>
-                <a:ea typeface="Helvetica" charset="0"/>
-                <a:cs typeface="Helvetica" charset="0"/>
-              </a:rPr>
-              <a:t>cross-product explosion</a:t>
-            </a:r>
-          </a:p>
-          <a:p>
-            <a:r>
-              <a:rPr lang="en-US" sz="2800" dirty="0">
-                <a:latin typeface="Helvetica" charset="0"/>
-                <a:ea typeface="Helvetica" charset="0"/>
-                <a:cs typeface="Helvetica" charset="0"/>
-              </a:rPr>
-              <a:t>Complex logic in kernel: rules with </a:t>
-            </a:r>
-            <a:r>
-              <a:rPr lang="en-US" sz="2800" dirty="0">
-                <a:solidFill>
-                  <a:srgbClr val="C00000"/>
-                </a:solidFill>
-                <a:latin typeface="Helvetica" charset="0"/>
-                <a:ea typeface="Helvetica" charset="0"/>
-                <a:cs typeface="Helvetica" charset="0"/>
-              </a:rPr>
-              <a:t>wildcards</a:t>
-            </a:r>
-            <a:r>
-              <a:rPr lang="en-US" sz="2800" dirty="0">
-                <a:latin typeface="Helvetica" charset="0"/>
-                <a:ea typeface="Helvetica" charset="0"/>
-                <a:cs typeface="Helvetica" charset="0"/>
-              </a:rPr>
-              <a:t> require complex </a:t>
-            </a:r>
-            <a:r>
-              <a:rPr lang="en-US" sz="2800" dirty="0" err="1">
-                <a:latin typeface="Helvetica" charset="0"/>
-                <a:ea typeface="Helvetica" charset="0"/>
-                <a:cs typeface="Helvetica" charset="0"/>
-              </a:rPr>
-              <a:t>algoriths</a:t>
-            </a:r>
-            <a:endParaRPr lang="en-US" sz="2800" dirty="0">
-              <a:latin typeface="Helvetica" charset="0"/>
-              <a:ea typeface="Helvetica" charset="0"/>
-              <a:cs typeface="Helvetica" charset="0"/>
-            </a:endParaRPr>
-          </a:p>
-        </p:txBody>
-      </p:sp>
-    </p:spTree>
-    <p:extLst>
-      <p:ext uri="{BB962C8B-B14F-4D97-AF65-F5344CB8AC3E}">
-        <p14:creationId xmlns:p14="http://schemas.microsoft.com/office/powerpoint/2010/main" val="1301110041"/>
-      </p:ext>
-    </p:extLst>
-  </p:cSld>
-  <p:clrMapOvr>
-    <a:masterClrMapping/>
-  </p:clrMapOvr>
-  <p:timing>
-    <p:tnLst>
-      <p:par>
-        <p:cTn id="1" dur="indefinite" restart="never" nodeType="tmRoot">
-          <p:childTnLst>
-            <p:seq concurrent="1" nextAc="seek">
-              <p:cTn id="2" dur="indefinite" nodeType="mainSeq">
-                <p:childTnLst>
-                  <p:par>
-                    <p:cTn id="3" fill="hold">
-                      <p:stCondLst>
-                        <p:cond delay="indefinite"/>
-                      </p:stCondLst>
-                      <p:childTnLst>
-                        <p:par>
-                          <p:cTn id="4" fill="hold">
-                            <p:stCondLst>
-                              <p:cond delay="0"/>
-                            </p:stCondLst>
-                            <p:childTnLst>
-                              <p:par>
-                                <p:cTn id="5" presetID="1" presetClass="entr" presetSubtype="0" fill="hold" nodeType="clickEffect">
-                                  <p:stCondLst>
-                                    <p:cond delay="0"/>
-                                  </p:stCondLst>
-                                  <p:childTnLst>
-                                    <p:set>
-                                      <p:cBhvr>
-                                        <p:cTn id="6" dur="1" fill="hold">
-                                          <p:stCondLst>
-                                            <p:cond delay="0"/>
-                                          </p:stCondLst>
-                                        </p:cTn>
-                                        <p:tgtEl>
-                                          <p:spTgt spid="6">
-                                            <p:txEl>
-                                              <p:pRg st="0" end="0"/>
-                                            </p:txEl>
-                                          </p:spTgt>
-                                        </p:tgtEl>
-                                        <p:attrNameLst>
-                                          <p:attrName>style.visibility</p:attrName>
-                                        </p:attrNameLst>
-                                      </p:cBhvr>
-                                      <p:to>
-                                        <p:strVal val="visible"/>
-                                      </p:to>
-                                    </p:set>
-                                  </p:childTnLst>
-                                </p:cTn>
-                              </p:par>
-                            </p:childTnLst>
-                          </p:cTn>
-                        </p:par>
-                      </p:childTnLst>
-                    </p:cTn>
-                  </p:par>
-                  <p:par>
-                    <p:cTn id="7" fill="hold">
-                      <p:stCondLst>
-                        <p:cond delay="indefinite"/>
-                      </p:stCondLst>
-                      <p:childTnLst>
-                        <p:par>
-                          <p:cTn id="8" fill="hold">
-                            <p:stCondLst>
-                              <p:cond delay="0"/>
-                            </p:stCondLst>
-                            <p:childTnLst>
-                              <p:par>
-                                <p:cTn id="9" presetID="1" presetClass="entr" presetSubtype="0" fill="hold" nodeType="clickEffect">
-                                  <p:stCondLst>
-                                    <p:cond delay="0"/>
-                                  </p:stCondLst>
-                                  <p:childTnLst>
-                                    <p:set>
-                                      <p:cBhvr>
-                                        <p:cTn id="10" dur="1" fill="hold">
-                                          <p:stCondLst>
-                                            <p:cond delay="0"/>
-                                          </p:stCondLst>
-                                        </p:cTn>
-                                        <p:tgtEl>
-                                          <p:spTgt spid="6">
-                                            <p:txEl>
-                                              <p:pRg st="1" end="1"/>
-                                            </p:txEl>
-                                          </p:spTgt>
-                                        </p:tgtEl>
-                                        <p:attrNameLst>
-                                          <p:attrName>style.visibility</p:attrName>
-                                        </p:attrNameLst>
-                                      </p:cBhvr>
-                                      <p:to>
-                                        <p:strVal val="visible"/>
-                                      </p:to>
-                                    </p:set>
-                                  </p:childTnLst>
-                                </p:cTn>
-                              </p:par>
-                            </p:childTnLst>
-                          </p:cTn>
-                        </p:par>
-                      </p:childTnLst>
-                    </p:cTn>
-                  </p:par>
-                  <p:par>
-                    <p:cTn id="11" fill="hold">
-                      <p:stCondLst>
-                        <p:cond delay="indefinite"/>
-                      </p:stCondLst>
-                      <p:childTnLst>
-                        <p:par>
-                          <p:cTn id="12" fill="hold">
-                            <p:stCondLst>
-                              <p:cond delay="0"/>
-                            </p:stCondLst>
-                            <p:childTnLst>
-                              <p:par>
-                                <p:cTn id="13" presetID="1" presetClass="entr" presetSubtype="0" fill="hold" nodeType="clickEffect">
-                                  <p:stCondLst>
-                                    <p:cond delay="0"/>
-                                  </p:stCondLst>
-                                  <p:childTnLst>
-                                    <p:set>
-                                      <p:cBhvr>
-                                        <p:cTn id="14" dur="1" fill="hold">
-                                          <p:stCondLst>
-                                            <p:cond delay="0"/>
-                                          </p:stCondLst>
-                                        </p:cTn>
-                                        <p:tgtEl>
-                                          <p:spTgt spid="6">
-                                            <p:txEl>
-                                              <p:pRg st="2" end="2"/>
-                                            </p:txEl>
-                                          </p:spTgt>
-                                        </p:tgtEl>
-                                        <p:attrNameLst>
-                                          <p:attrName>style.visibility</p:attrName>
-                                        </p:attrNameLst>
-                                      </p:cBhvr>
-                                      <p:to>
-                                        <p:strVal val="visible"/>
-                                      </p:to>
-                                    </p:set>
-                                  </p:childTnLst>
-                                </p:cTn>
-                              </p:par>
-                            </p:childTnLst>
-                          </p:cTn>
-                        </p:par>
-                      </p:childTnLst>
-                    </p:cTn>
-                  </p:par>
-                </p:childTnLst>
-              </p:cTn>
-              <p:prevCondLst>
-                <p:cond evt="onPrev" delay="0">
-                  <p:tgtEl>
-                    <p:sldTgt/>
-                  </p:tgtEl>
-                </p:cond>
-              </p:prevCondLst>
-              <p:nextCondLst>
-                <p:cond evt="onNext" delay="0">
-                  <p:tgtEl>
-                    <p:sldTgt/>
-                  </p:tgtEl>
-                </p:cond>
-              </p:nextCondLst>
-            </p:seq>
-          </p:childTnLst>
-        </p:cTn>
-      </p:par>
-    </p:tnLst>
-  </p:timing>
-</p:sld>
-</file>
-
-<file path=ppt/slides/slide22.xml><?xml version="1.0" encoding="utf-8"?>
-<p:sld xmlns:a="http://schemas.openxmlformats.org/drawingml/2006/main" xmlns:r="http://schemas.openxmlformats.org/officeDocument/2006/relationships" xmlns:p="http://schemas.openxmlformats.org/presentationml/2006/main">
-  <p:cSld>
-    <p:spTree>
-      <p:nvGrpSpPr>
-        <p:cNvPr id="1" name=""/>
-        <p:cNvGrpSpPr/>
-        <p:nvPr/>
-      </p:nvGrpSpPr>
-      <p:grpSpPr>
-        <a:xfrm>
-          <a:off x="0" y="0"/>
-          <a:ext cx="0" cy="0"/>
-          <a:chOff x="0" y="0"/>
-          <a:chExt cx="0" cy="0"/>
-        </a:xfrm>
-      </p:grpSpPr>
-      <p:sp>
-        <p:nvSpPr>
-          <p:cNvPr id="2" name="Title 1"/>
-          <p:cNvSpPr>
-            <a:spLocks noGrp="1"/>
-          </p:cNvSpPr>
-          <p:nvPr>
-            <p:ph type="title"/>
-          </p:nvPr>
-        </p:nvSpPr>
-        <p:spPr/>
-        <p:txBody>
-          <a:bodyPr/>
-          <a:lstStyle/>
-          <a:p>
-            <a:r>
-              <a:rPr lang="en-US" dirty="0"/>
-              <a:t>Idea 1: </a:t>
-            </a:r>
-            <a:r>
-              <a:rPr lang="en-US" dirty="0" err="1"/>
-              <a:t>Microflow</a:t>
-            </a:r>
-            <a:r>
-              <a:rPr lang="en-US" dirty="0"/>
-              <a:t> cache</a:t>
-            </a:r>
-          </a:p>
-        </p:txBody>
-      </p:sp>
-      <p:sp>
-        <p:nvSpPr>
-          <p:cNvPr id="3" name="Content Placeholder 2"/>
-          <p:cNvSpPr>
-            <a:spLocks noGrp="1"/>
-          </p:cNvSpPr>
-          <p:nvPr>
-            <p:ph idx="1"/>
-          </p:nvPr>
-        </p:nvSpPr>
-        <p:spPr>
-          <a:xfrm>
-            <a:off x="838200" y="1652628"/>
-            <a:ext cx="10515600" cy="4351338"/>
-          </a:xfrm>
-        </p:spPr>
-        <p:txBody>
-          <a:bodyPr/>
-          <a:lstStyle/>
-          <a:p>
-            <a:r>
-              <a:rPr lang="en-US" dirty="0"/>
-              <a:t>Microflow: complete set of packet headers with action</a:t>
-            </a:r>
-          </a:p>
-          <a:p>
-            <a:pPr lvl="1"/>
-            <a:r>
-              <a:rPr lang="en-US" dirty="0"/>
-              <a:t>Example: </a:t>
-            </a:r>
-            <a:r>
-              <a:rPr lang="en-US" dirty="0" err="1"/>
-              <a:t>srcIP</a:t>
-            </a:r>
-            <a:r>
-              <a:rPr lang="en-US" dirty="0"/>
-              <a:t>, </a:t>
-            </a:r>
-            <a:r>
-              <a:rPr lang="en-US" dirty="0" err="1"/>
-              <a:t>dstIP</a:t>
-            </a:r>
-            <a:r>
-              <a:rPr lang="en-US" dirty="0"/>
-              <a:t>, IP TTL, </a:t>
-            </a:r>
-            <a:r>
-              <a:rPr lang="en-US" dirty="0" err="1"/>
-              <a:t>srcMAC</a:t>
-            </a:r>
-            <a:r>
-              <a:rPr lang="en-US" dirty="0"/>
-              <a:t>, </a:t>
-            </a:r>
-            <a:r>
-              <a:rPr lang="en-US" dirty="0" err="1"/>
-              <a:t>dstMAC</a:t>
-            </a:r>
-            <a:endParaRPr lang="en-US" dirty="0"/>
-          </a:p>
-          <a:p>
-            <a:r>
-              <a:rPr lang="en-US" dirty="0"/>
-              <a:t>Same insight as </a:t>
-            </a:r>
-            <a:r>
-              <a:rPr lang="en-US" dirty="0">
-                <a:solidFill>
-                  <a:srgbClr val="C00000"/>
-                </a:solidFill>
-              </a:rPr>
-              <a:t>tuple space search; </a:t>
-            </a:r>
-            <a:r>
-              <a:rPr lang="en-US" dirty="0"/>
-              <a:t>attempt to do </a:t>
-            </a:r>
-            <a:r>
-              <a:rPr lang="en-US" dirty="0">
-                <a:solidFill>
-                  <a:srgbClr val="C00000"/>
-                </a:solidFill>
-              </a:rPr>
-              <a:t>one memory lookup per packet</a:t>
-            </a:r>
-          </a:p>
-        </p:txBody>
-      </p:sp>
-      <p:sp>
-        <p:nvSpPr>
-          <p:cNvPr id="4" name="Triangle 3"/>
-          <p:cNvSpPr/>
-          <p:nvPr/>
-        </p:nvSpPr>
-        <p:spPr>
-          <a:xfrm>
-            <a:off x="3352799" y="3179762"/>
-            <a:ext cx="4792134" cy="3559704"/>
-          </a:xfrm>
-          <a:prstGeom prst="triangle">
-            <a:avLst/>
-          </a:prstGeom>
-          <a:noFill/>
-          <a:ln w="50800">
-            <a:solidFill>
-              <a:schemeClr val="tx1"/>
-            </a:solidFill>
-          </a:ln>
-        </p:spPr>
-        <p:style>
-          <a:lnRef idx="2">
-            <a:schemeClr val="accent1">
-              <a:shade val="50000"/>
-            </a:schemeClr>
-          </a:lnRef>
-          <a:fillRef idx="1">
-            <a:schemeClr val="accent1"/>
-          </a:fillRef>
-          <a:effectRef idx="0">
-            <a:schemeClr val="accent1"/>
-          </a:effectRef>
-          <a:fontRef idx="minor">
-            <a:schemeClr val="lt1"/>
-          </a:fontRef>
-        </p:style>
-        <p:txBody>
-          <a:bodyPr rtlCol="0" anchor="ctr"/>
-          <a:lstStyle/>
-          <a:p>
-            <a:pPr algn="ctr"/>
-            <a:endParaRPr lang="en-US"/>
-          </a:p>
-        </p:txBody>
-      </p:sp>
-      <p:cxnSp>
-        <p:nvCxnSpPr>
-          <p:cNvPr id="6" name="Straight Connector 5"/>
-          <p:cNvCxnSpPr/>
-          <p:nvPr/>
-        </p:nvCxnSpPr>
-        <p:spPr>
-          <a:xfrm>
-            <a:off x="838200" y="4875213"/>
-            <a:ext cx="10964333" cy="0"/>
-          </a:xfrm>
-          <a:prstGeom prst="line">
-            <a:avLst/>
-          </a:prstGeom>
-          <a:ln w="50800">
-            <a:solidFill>
-              <a:schemeClr val="tx1"/>
-            </a:solidFill>
-            <a:prstDash val="sysDot"/>
-          </a:ln>
-        </p:spPr>
-        <p:style>
-          <a:lnRef idx="1">
-            <a:schemeClr val="accent1"/>
-          </a:lnRef>
-          <a:fillRef idx="0">
-            <a:schemeClr val="accent1"/>
-          </a:fillRef>
-          <a:effectRef idx="0">
-            <a:schemeClr val="accent1"/>
-          </a:effectRef>
-          <a:fontRef idx="minor">
-            <a:schemeClr val="tx1"/>
-          </a:fontRef>
-        </p:style>
-      </p:cxnSp>
-      <p:sp>
-        <p:nvSpPr>
-          <p:cNvPr id="8" name="TextBox 7"/>
-          <p:cNvSpPr txBox="1"/>
-          <p:nvPr/>
-        </p:nvSpPr>
-        <p:spPr>
-          <a:xfrm>
-            <a:off x="8593666" y="3419719"/>
-            <a:ext cx="2760134" cy="954107"/>
-          </a:xfrm>
-          <a:prstGeom prst="rect">
-            <a:avLst/>
-          </a:prstGeom>
-          <a:noFill/>
-        </p:spPr>
-        <p:txBody>
-          <a:bodyPr wrap="square" rtlCol="0">
-            <a:spAutoFit/>
-          </a:bodyPr>
-          <a:lstStyle/>
-          <a:p>
-            <a:r>
-              <a:rPr lang="en-US" sz="2800" dirty="0" err="1">
-                <a:latin typeface="Helvetica" charset="0"/>
-                <a:ea typeface="Helvetica" charset="0"/>
-                <a:cs typeface="Helvetica" charset="0"/>
-              </a:rPr>
-              <a:t>Microflow</a:t>
-            </a:r>
-            <a:r>
-              <a:rPr lang="en-US" sz="2800" dirty="0">
-                <a:latin typeface="Helvetica" charset="0"/>
-                <a:ea typeface="Helvetica" charset="0"/>
-                <a:cs typeface="Helvetica" charset="0"/>
-              </a:rPr>
-              <a:t> cache in the kernel</a:t>
-            </a:r>
-          </a:p>
-        </p:txBody>
-      </p:sp>
-      <p:sp>
-        <p:nvSpPr>
-          <p:cNvPr id="9" name="TextBox 8"/>
-          <p:cNvSpPr txBox="1"/>
-          <p:nvPr/>
-        </p:nvSpPr>
-        <p:spPr>
-          <a:xfrm>
-            <a:off x="8593666" y="5451719"/>
-            <a:ext cx="2760134" cy="954107"/>
-          </a:xfrm>
-          <a:prstGeom prst="rect">
-            <a:avLst/>
-          </a:prstGeom>
-          <a:noFill/>
-        </p:spPr>
-        <p:txBody>
-          <a:bodyPr wrap="square" rtlCol="0">
-            <a:spAutoFit/>
-          </a:bodyPr>
-          <a:lstStyle/>
-          <a:p>
-            <a:r>
-              <a:rPr lang="en-US" sz="2800" dirty="0" err="1">
-                <a:latin typeface="Helvetica" charset="0"/>
-                <a:ea typeface="Helvetica" charset="0"/>
-                <a:cs typeface="Helvetica" charset="0"/>
-              </a:rPr>
-              <a:t>Openflow</a:t>
-            </a:r>
-            <a:r>
-              <a:rPr lang="en-US" sz="2800" dirty="0">
-                <a:latin typeface="Helvetica" charset="0"/>
-                <a:ea typeface="Helvetica" charset="0"/>
-                <a:cs typeface="Helvetica" charset="0"/>
-              </a:rPr>
-              <a:t> table in user space</a:t>
-            </a:r>
-          </a:p>
-        </p:txBody>
-      </p:sp>
-      <p:sp>
-        <p:nvSpPr>
-          <p:cNvPr id="11" name="Freeform 10"/>
-          <p:cNvSpPr/>
-          <p:nvPr/>
-        </p:nvSpPr>
-        <p:spPr>
-          <a:xfrm>
-            <a:off x="4521200" y="3437466"/>
-            <a:ext cx="2624667" cy="848023"/>
-          </a:xfrm>
-          <a:custGeom>
-            <a:avLst/>
-            <a:gdLst>
-              <a:gd name="connsiteX0" fmla="*/ 0 w 2624667"/>
-              <a:gd name="connsiteY0" fmla="*/ 0 h 848023"/>
-              <a:gd name="connsiteX1" fmla="*/ 829733 w 2624667"/>
-              <a:gd name="connsiteY1" fmla="*/ 728134 h 848023"/>
-              <a:gd name="connsiteX2" fmla="*/ 1659467 w 2624667"/>
-              <a:gd name="connsiteY2" fmla="*/ 795867 h 848023"/>
-              <a:gd name="connsiteX3" fmla="*/ 2624667 w 2624667"/>
-              <a:gd name="connsiteY3" fmla="*/ 203200 h 848023"/>
-            </a:gdLst>
-            <a:ahLst/>
-            <a:cxnLst>
-              <a:cxn ang="0">
-                <a:pos x="connsiteX0" y="connsiteY0"/>
-              </a:cxn>
-              <a:cxn ang="0">
-                <a:pos x="connsiteX1" y="connsiteY1"/>
-              </a:cxn>
-              <a:cxn ang="0">
-                <a:pos x="connsiteX2" y="connsiteY2"/>
-              </a:cxn>
-              <a:cxn ang="0">
-                <a:pos x="connsiteX3" y="connsiteY3"/>
-              </a:cxn>
-            </a:cxnLst>
-            <a:rect l="l" t="t" r="r" b="b"/>
-            <a:pathLst>
-              <a:path w="2624667" h="848023">
-                <a:moveTo>
-                  <a:pt x="0" y="0"/>
-                </a:moveTo>
-                <a:cubicBezTo>
-                  <a:pt x="276577" y="297745"/>
-                  <a:pt x="553155" y="595490"/>
-                  <a:pt x="829733" y="728134"/>
-                </a:cubicBezTo>
-                <a:cubicBezTo>
-                  <a:pt x="1106311" y="860778"/>
-                  <a:pt x="1360311" y="883356"/>
-                  <a:pt x="1659467" y="795867"/>
-                </a:cubicBezTo>
-                <a:cubicBezTo>
-                  <a:pt x="1958623" y="708378"/>
-                  <a:pt x="2624667" y="203200"/>
-                  <a:pt x="2624667" y="203200"/>
-                </a:cubicBezTo>
-              </a:path>
-            </a:pathLst>
-          </a:custGeom>
-          <a:noFill/>
-          <a:ln w="50800">
-            <a:solidFill>
-              <a:srgbClr val="C00000"/>
-            </a:solidFill>
-            <a:headEnd type="none" w="lg" len="lg"/>
-            <a:tailEnd type="triangle" w="lg" len="lg"/>
-          </a:ln>
-        </p:spPr>
-        <p:style>
-          <a:lnRef idx="2">
-            <a:schemeClr val="accent1">
-              <a:shade val="50000"/>
-            </a:schemeClr>
-          </a:lnRef>
-          <a:fillRef idx="1">
-            <a:schemeClr val="accent1"/>
-          </a:fillRef>
-          <a:effectRef idx="0">
-            <a:schemeClr val="accent1"/>
-          </a:effectRef>
-          <a:fontRef idx="minor">
-            <a:schemeClr val="lt1"/>
-          </a:fontRef>
-        </p:style>
-        <p:txBody>
-          <a:bodyPr rtlCol="0" anchor="ctr"/>
-          <a:lstStyle/>
-          <a:p>
-            <a:pPr algn="ctr"/>
-            <a:endParaRPr lang="en-US">
-              <a:solidFill>
-                <a:srgbClr val="C00000"/>
-              </a:solidFill>
-            </a:endParaRPr>
-          </a:p>
-        </p:txBody>
-      </p:sp>
-      <p:sp>
-        <p:nvSpPr>
-          <p:cNvPr id="12" name="Freeform 11"/>
-          <p:cNvSpPr/>
-          <p:nvPr/>
-        </p:nvSpPr>
-        <p:spPr>
-          <a:xfrm>
-            <a:off x="4504267" y="4064000"/>
-            <a:ext cx="3115733" cy="2153301"/>
-          </a:xfrm>
-          <a:custGeom>
-            <a:avLst/>
-            <a:gdLst>
-              <a:gd name="connsiteX0" fmla="*/ 0 w 3115733"/>
-              <a:gd name="connsiteY0" fmla="*/ 0 h 2153301"/>
-              <a:gd name="connsiteX1" fmla="*/ 677333 w 3115733"/>
-              <a:gd name="connsiteY1" fmla="*/ 1557866 h 2153301"/>
-              <a:gd name="connsiteX2" fmla="*/ 1303866 w 3115733"/>
-              <a:gd name="connsiteY2" fmla="*/ 2150533 h 2153301"/>
-              <a:gd name="connsiteX3" fmla="*/ 2032000 w 3115733"/>
-              <a:gd name="connsiteY3" fmla="*/ 1710266 h 2153301"/>
-              <a:gd name="connsiteX4" fmla="*/ 3115733 w 3115733"/>
-              <a:gd name="connsiteY4" fmla="*/ 254000 h 2153301"/>
-            </a:gdLst>
-            <a:ahLst/>
-            <a:cxnLst>
-              <a:cxn ang="0">
-                <a:pos x="connsiteX0" y="connsiteY0"/>
-              </a:cxn>
-              <a:cxn ang="0">
-                <a:pos x="connsiteX1" y="connsiteY1"/>
-              </a:cxn>
-              <a:cxn ang="0">
-                <a:pos x="connsiteX2" y="connsiteY2"/>
-              </a:cxn>
-              <a:cxn ang="0">
-                <a:pos x="connsiteX3" y="connsiteY3"/>
-              </a:cxn>
-              <a:cxn ang="0">
-                <a:pos x="connsiteX4" y="connsiteY4"/>
-              </a:cxn>
-            </a:cxnLst>
-            <a:rect l="l" t="t" r="r" b="b"/>
-            <a:pathLst>
-              <a:path w="3115733" h="2153301">
-                <a:moveTo>
-                  <a:pt x="0" y="0"/>
-                </a:moveTo>
-                <a:cubicBezTo>
-                  <a:pt x="230011" y="599722"/>
-                  <a:pt x="460022" y="1199444"/>
-                  <a:pt x="677333" y="1557866"/>
-                </a:cubicBezTo>
-                <a:cubicBezTo>
-                  <a:pt x="894644" y="1916288"/>
-                  <a:pt x="1078088" y="2125133"/>
-                  <a:pt x="1303866" y="2150533"/>
-                </a:cubicBezTo>
-                <a:cubicBezTo>
-                  <a:pt x="1529644" y="2175933"/>
-                  <a:pt x="1730022" y="2026355"/>
-                  <a:pt x="2032000" y="1710266"/>
-                </a:cubicBezTo>
-                <a:cubicBezTo>
-                  <a:pt x="2333978" y="1394177"/>
-                  <a:pt x="3115733" y="254000"/>
-                  <a:pt x="3115733" y="254000"/>
-                </a:cubicBezTo>
-              </a:path>
-            </a:pathLst>
-          </a:custGeom>
-          <a:noFill/>
-          <a:ln w="50800">
-            <a:solidFill>
-              <a:srgbClr val="C00000"/>
-            </a:solidFill>
-            <a:headEnd type="none" w="lg" len="lg"/>
-            <a:tailEnd type="triangle" w="lg" len="lg"/>
-          </a:ln>
-        </p:spPr>
-        <p:style>
-          <a:lnRef idx="2">
-            <a:schemeClr val="accent1">
-              <a:shade val="50000"/>
-            </a:schemeClr>
-          </a:lnRef>
-          <a:fillRef idx="1">
-            <a:schemeClr val="accent1"/>
-          </a:fillRef>
-          <a:effectRef idx="0">
-            <a:schemeClr val="accent1"/>
-          </a:effectRef>
-          <a:fontRef idx="minor">
-            <a:schemeClr val="lt1"/>
-          </a:fontRef>
-        </p:style>
-        <p:txBody>
-          <a:bodyPr rtlCol="0" anchor="ctr"/>
-          <a:lstStyle/>
-          <a:p>
-            <a:pPr algn="ctr"/>
-            <a:endParaRPr lang="en-US">
-              <a:solidFill>
-                <a:srgbClr val="C00000"/>
-              </a:solidFill>
-            </a:endParaRPr>
-          </a:p>
-        </p:txBody>
-      </p:sp>
-      <p:sp>
-        <p:nvSpPr>
-          <p:cNvPr id="14" name="TextBox 13"/>
-          <p:cNvSpPr txBox="1"/>
-          <p:nvPr/>
-        </p:nvSpPr>
-        <p:spPr>
-          <a:xfrm>
-            <a:off x="7145867" y="3373552"/>
-            <a:ext cx="706966" cy="523220"/>
-          </a:xfrm>
-          <a:prstGeom prst="rect">
-            <a:avLst/>
-          </a:prstGeom>
-          <a:noFill/>
-        </p:spPr>
-        <p:txBody>
-          <a:bodyPr wrap="square" rtlCol="0">
-            <a:spAutoFit/>
-          </a:bodyPr>
-          <a:lstStyle/>
-          <a:p>
-            <a:r>
-              <a:rPr lang="en-US" sz="2800" dirty="0">
-                <a:latin typeface="Helvetica" charset="0"/>
-                <a:ea typeface="Helvetica" charset="0"/>
-                <a:cs typeface="Helvetica" charset="0"/>
-              </a:rPr>
-              <a:t>Hit</a:t>
-            </a:r>
-          </a:p>
-        </p:txBody>
-      </p:sp>
-      <p:sp>
-        <p:nvSpPr>
-          <p:cNvPr id="15" name="TextBox 14"/>
-          <p:cNvSpPr txBox="1"/>
-          <p:nvPr/>
-        </p:nvSpPr>
-        <p:spPr>
-          <a:xfrm>
-            <a:off x="4146349" y="5641850"/>
-            <a:ext cx="1128185" cy="523220"/>
-          </a:xfrm>
-          <a:prstGeom prst="rect">
-            <a:avLst/>
-          </a:prstGeom>
-          <a:noFill/>
-        </p:spPr>
-        <p:txBody>
-          <a:bodyPr wrap="square" rtlCol="0">
-            <a:spAutoFit/>
-          </a:bodyPr>
-          <a:lstStyle/>
-          <a:p>
-            <a:r>
-              <a:rPr lang="en-US" sz="2800" dirty="0">
-                <a:latin typeface="Helvetica" charset="0"/>
-                <a:ea typeface="Helvetica" charset="0"/>
-                <a:cs typeface="Helvetica" charset="0"/>
-              </a:rPr>
-              <a:t>Miss</a:t>
-            </a:r>
-          </a:p>
-        </p:txBody>
-      </p:sp>
-      <p:sp>
-        <p:nvSpPr>
-          <p:cNvPr id="18" name="TextBox 17"/>
-          <p:cNvSpPr txBox="1"/>
-          <p:nvPr/>
-        </p:nvSpPr>
-        <p:spPr>
-          <a:xfrm>
-            <a:off x="1193798" y="3659496"/>
-            <a:ext cx="2159001" cy="954107"/>
-          </a:xfrm>
-          <a:prstGeom prst="rect">
-            <a:avLst/>
-          </a:prstGeom>
-          <a:noFill/>
-        </p:spPr>
-        <p:txBody>
-          <a:bodyPr wrap="square" rtlCol="0">
-            <a:spAutoFit/>
-          </a:bodyPr>
-          <a:lstStyle/>
-          <a:p>
-            <a:pPr algn="ctr"/>
-            <a:r>
-              <a:rPr lang="en-US" sz="2800" dirty="0">
-                <a:latin typeface="Helvetica" charset="0"/>
-                <a:ea typeface="Helvetica" charset="0"/>
-                <a:cs typeface="Helvetica" charset="0"/>
-              </a:rPr>
-              <a:t>Use a large hash table</a:t>
-            </a:r>
-          </a:p>
-        </p:txBody>
-      </p:sp>
-    </p:spTree>
-    <p:extLst>
-      <p:ext uri="{BB962C8B-B14F-4D97-AF65-F5344CB8AC3E}">
-        <p14:creationId xmlns:p14="http://schemas.microsoft.com/office/powerpoint/2010/main" val="817803292"/>
-      </p:ext>
-    </p:extLst>
-  </p:cSld>
-  <p:clrMapOvr>
-    <a:masterClrMapping/>
-  </p:clrMapOvr>
-  <p:timing>
-    <p:tnLst>
-      <p:par>
-        <p:cTn id="1" dur="indefinite" restart="never" nodeType="tmRoot">
-          <p:childTnLst>
-            <p:seq concurrent="1" nextAc="seek">
-              <p:cTn id="2" dur="indefinite" nodeType="mainSeq">
-                <p:childTnLst>
-                  <p:par>
-                    <p:cTn id="3" fill="hold">
-                      <p:stCondLst>
-                        <p:cond delay="indefinite"/>
-                      </p:stCondLst>
-                      <p:childTnLst>
-                        <p:par>
-                          <p:cTn id="4" fill="hold">
-                            <p:stCondLst>
-                              <p:cond delay="0"/>
-                            </p:stCondLst>
-                            <p:childTnLst>
-                              <p:par>
-                                <p:cTn id="5" presetID="1" presetClass="entr" presetSubtype="0" fill="hold" nodeType="clickEffect">
-                                  <p:stCondLst>
-                                    <p:cond delay="0"/>
-                                  </p:stCondLst>
-                                  <p:childTnLst>
-                                    <p:set>
-                                      <p:cBhvr>
-                                        <p:cTn id="6" dur="1" fill="hold">
-                                          <p:stCondLst>
-                                            <p:cond delay="0"/>
-                                          </p:stCondLst>
-                                        </p:cTn>
-                                        <p:tgtEl>
-                                          <p:spTgt spid="3">
-                                            <p:txEl>
-                                              <p:pRg st="2" end="2"/>
-                                            </p:txEl>
-                                          </p:spTgt>
-                                        </p:tgtEl>
-                                        <p:attrNameLst>
-                                          <p:attrName>style.visibility</p:attrName>
-                                        </p:attrNameLst>
-                                      </p:cBhvr>
-                                      <p:to>
-                                        <p:strVal val="visible"/>
-                                      </p:to>
-                                    </p:set>
-                                  </p:childTnLst>
-                                </p:cTn>
-                              </p:par>
-                            </p:childTnLst>
-                          </p:cTn>
-                        </p:par>
-                      </p:childTnLst>
-                    </p:cTn>
-                  </p:par>
-                </p:childTnLst>
-              </p:cTn>
-              <p:prevCondLst>
-                <p:cond evt="onPrev" delay="0">
-                  <p:tgtEl>
-                    <p:sldTgt/>
-                  </p:tgtEl>
-                </p:cond>
-              </p:prevCondLst>
-              <p:nextCondLst>
-                <p:cond evt="onNext" delay="0">
-                  <p:tgtEl>
-                    <p:sldTgt/>
-                  </p:tgtEl>
-                </p:cond>
-              </p:nextCondLst>
-            </p:seq>
-          </p:childTnLst>
-        </p:cTn>
-      </p:par>
-    </p:tnLst>
-  </p:timing>
-</p:sld>
-</file>
-
-<file path=ppt/slides/slide23.xml><?xml version="1.0" encoding="utf-8"?>
-<p:sld xmlns:a="http://schemas.openxmlformats.org/drawingml/2006/main" xmlns:r="http://schemas.openxmlformats.org/officeDocument/2006/relationships" xmlns:p="http://schemas.openxmlformats.org/presentationml/2006/main">
-  <p:cSld>
-    <p:spTree>
-      <p:nvGrpSpPr>
-        <p:cNvPr id="1" name=""/>
-        <p:cNvGrpSpPr/>
-        <p:nvPr/>
-      </p:nvGrpSpPr>
-      <p:grpSpPr>
-        <a:xfrm>
-          <a:off x="0" y="0"/>
-          <a:ext cx="0" cy="0"/>
-          <a:chOff x="0" y="0"/>
-          <a:chExt cx="0" cy="0"/>
-        </a:xfrm>
-      </p:grpSpPr>
-      <p:sp>
-        <p:nvSpPr>
-          <p:cNvPr id="2" name="Title 1"/>
-          <p:cNvSpPr>
-            <a:spLocks noGrp="1"/>
-          </p:cNvSpPr>
-          <p:nvPr>
-            <p:ph type="title"/>
-          </p:nvPr>
-        </p:nvSpPr>
-        <p:spPr/>
-        <p:txBody>
-          <a:bodyPr/>
-          <a:lstStyle/>
-          <a:p>
-            <a:r>
-              <a:rPr lang="en-US" dirty="0"/>
-              <a:t>Problems with micro-flows</a:t>
-            </a:r>
-          </a:p>
-        </p:txBody>
-      </p:sp>
-      <p:sp>
-        <p:nvSpPr>
-          <p:cNvPr id="3" name="Content Placeholder 2"/>
-          <p:cNvSpPr>
-            <a:spLocks noGrp="1"/>
-          </p:cNvSpPr>
-          <p:nvPr>
-            <p:ph idx="1"/>
-          </p:nvPr>
-        </p:nvSpPr>
-        <p:spPr>
-          <a:xfrm>
-            <a:off x="838200" y="1825624"/>
-            <a:ext cx="10515600" cy="4896451"/>
-          </a:xfrm>
-        </p:spPr>
-        <p:txBody>
-          <a:bodyPr>
-            <a:normAutofit/>
-          </a:bodyPr>
-          <a:lstStyle/>
-          <a:p>
-            <a:r>
-              <a:rPr lang="en-US" dirty="0"/>
-              <a:t>Too many micro-flows: e.g., each TCP port</a:t>
-            </a:r>
-          </a:p>
-          <a:p>
-            <a:r>
-              <a:rPr lang="is-IS" dirty="0"/>
-              <a:t>Many micro-flows may be short lived</a:t>
-            </a:r>
-          </a:p>
-          <a:p>
-            <a:pPr lvl="1"/>
-            <a:r>
-              <a:rPr lang="is-IS" dirty="0"/>
-              <a:t>Poor cache-hit rate for memory lookup</a:t>
-            </a:r>
-          </a:p>
-          <a:p>
-            <a:endParaRPr lang="is-IS" dirty="0"/>
-          </a:p>
-          <a:p>
-            <a:r>
-              <a:rPr lang="is-IS" dirty="0"/>
-              <a:t>Can we cache the outcome of rule lookup directly?</a:t>
-            </a:r>
-          </a:p>
-          <a:p>
-            <a:endParaRPr lang="is-IS" dirty="0"/>
-          </a:p>
-          <a:p>
-            <a:r>
-              <a:rPr lang="en-US" dirty="0"/>
-              <a:t>N</a:t>
-            </a:r>
-            <a:r>
-              <a:rPr lang="is-IS" dirty="0"/>
-              <a:t>aive approach: Cross-product explosion!</a:t>
-            </a:r>
-          </a:p>
-          <a:p>
-            <a:pPr lvl="1"/>
-            <a:r>
-              <a:rPr lang="is-IS" dirty="0"/>
-              <a:t>Example: Table 1 on source IP, table 2 on destination IP</a:t>
-            </a:r>
-          </a:p>
-          <a:p>
-            <a:pPr lvl="1"/>
-            <a:endParaRPr lang="is-IS" dirty="0"/>
-          </a:p>
-          <a:p>
-            <a:r>
-              <a:rPr lang="is-IS" dirty="0"/>
-              <a:t>Recurring theme: </a:t>
-            </a:r>
-            <a:r>
-              <a:rPr lang="is-IS" dirty="0">
-                <a:solidFill>
-                  <a:srgbClr val="C00000"/>
-                </a:solidFill>
-              </a:rPr>
-              <a:t>avoid up-front (proactive) costs </a:t>
-            </a:r>
-            <a:endParaRPr lang="en-US" dirty="0">
-              <a:solidFill>
-                <a:srgbClr val="C00000"/>
-              </a:solidFill>
-            </a:endParaRPr>
-          </a:p>
-          <a:p>
-            <a:endParaRPr lang="en-US" dirty="0"/>
-          </a:p>
-        </p:txBody>
-      </p:sp>
-    </p:spTree>
-    <p:extLst>
-      <p:ext uri="{BB962C8B-B14F-4D97-AF65-F5344CB8AC3E}">
-        <p14:creationId xmlns:p14="http://schemas.microsoft.com/office/powerpoint/2010/main" val="531930462"/>
-      </p:ext>
-    </p:extLst>
-  </p:cSld>
-  <p:clrMapOvr>
-    <a:masterClrMapping/>
-  </p:clrMapOvr>
-</p:sld>
-</file>
-
-<file path=ppt/slides/slide24.xml><?xml version="1.0" encoding="utf-8"?>
-<p:sld xmlns:a="http://schemas.openxmlformats.org/drawingml/2006/main" xmlns:r="http://schemas.openxmlformats.org/officeDocument/2006/relationships" xmlns:p="http://schemas.openxmlformats.org/presentationml/2006/main">
-  <p:cSld>
-    <p:spTree>
-      <p:nvGrpSpPr>
-        <p:cNvPr id="1" name=""/>
-        <p:cNvGrpSpPr/>
-        <p:nvPr/>
-      </p:nvGrpSpPr>
-      <p:grpSpPr>
-        <a:xfrm>
-          <a:off x="0" y="0"/>
-          <a:ext cx="0" cy="0"/>
-          <a:chOff x="0" y="0"/>
-          <a:chExt cx="0" cy="0"/>
-        </a:xfrm>
-      </p:grpSpPr>
-      <p:sp>
-        <p:nvSpPr>
-          <p:cNvPr id="2" name="Title 1"/>
-          <p:cNvSpPr>
-            <a:spLocks noGrp="1"/>
-          </p:cNvSpPr>
-          <p:nvPr>
-            <p:ph type="title"/>
-          </p:nvPr>
-        </p:nvSpPr>
-        <p:spPr/>
-        <p:txBody>
-          <a:bodyPr/>
-          <a:lstStyle/>
-          <a:p>
-            <a:r>
-              <a:rPr lang="en-US" dirty="0"/>
-              <a:t>Idea 2: Mega-flow cache</a:t>
-            </a:r>
-          </a:p>
-        </p:txBody>
-      </p:sp>
-      <p:sp>
-        <p:nvSpPr>
-          <p:cNvPr id="3" name="Content Placeholder 2"/>
-          <p:cNvSpPr>
-            <a:spLocks noGrp="1"/>
-          </p:cNvSpPr>
-          <p:nvPr>
-            <p:ph idx="1"/>
-          </p:nvPr>
-        </p:nvSpPr>
-        <p:spPr>
-          <a:xfrm>
-            <a:off x="838199" y="1825625"/>
-            <a:ext cx="11167533" cy="4351338"/>
-          </a:xfrm>
-        </p:spPr>
-        <p:txBody>
-          <a:bodyPr/>
-          <a:lstStyle/>
-          <a:p>
-            <a:r>
-              <a:rPr lang="en-US" dirty="0"/>
-              <a:t>Build the cache of rules </a:t>
-            </a:r>
-            <a:r>
-              <a:rPr lang="en-US" dirty="0">
-                <a:solidFill>
-                  <a:srgbClr val="C00000"/>
-                </a:solidFill>
-              </a:rPr>
-              <a:t>lazily</a:t>
-            </a:r>
-            <a:r>
-              <a:rPr lang="en-US" dirty="0"/>
-              <a:t> using just the </a:t>
-            </a:r>
-            <a:r>
-              <a:rPr lang="en-US" dirty="0">
-                <a:solidFill>
-                  <a:srgbClr val="C00000"/>
-                </a:solidFill>
-              </a:rPr>
-              <a:t>fields accessed</a:t>
-            </a:r>
-            <a:endParaRPr lang="en-US" dirty="0"/>
-          </a:p>
-          <a:p>
-            <a:pPr lvl="1"/>
-            <a:r>
-              <a:rPr lang="en-US" dirty="0"/>
-              <a:t>Ex: contain just </a:t>
-            </a:r>
-            <a:r>
-              <a:rPr lang="en-US" dirty="0" err="1"/>
-              <a:t>src</a:t>
-            </a:r>
-            <a:r>
-              <a:rPr lang="en-US" dirty="0"/>
-              <a:t>/</a:t>
-            </a:r>
-            <a:r>
-              <a:rPr lang="en-US" dirty="0" err="1"/>
-              <a:t>dst</a:t>
-            </a:r>
-            <a:r>
-              <a:rPr lang="en-US" dirty="0"/>
-              <a:t> IP combinations that appeared in packets</a:t>
-            </a:r>
-          </a:p>
-          <a:p>
-            <a:pPr lvl="1"/>
-            <a:endParaRPr lang="en-US" dirty="0"/>
-          </a:p>
-          <a:p>
-            <a:endParaRPr lang="en-US" dirty="0"/>
-          </a:p>
-        </p:txBody>
-      </p:sp>
-      <p:cxnSp>
-        <p:nvCxnSpPr>
-          <p:cNvPr id="4" name="Straight Connector 3"/>
-          <p:cNvCxnSpPr/>
-          <p:nvPr/>
-        </p:nvCxnSpPr>
-        <p:spPr>
-          <a:xfrm>
-            <a:off x="838200" y="4875213"/>
-            <a:ext cx="10964333" cy="0"/>
-          </a:xfrm>
-          <a:prstGeom prst="line">
-            <a:avLst/>
-          </a:prstGeom>
-          <a:ln w="50800">
-            <a:solidFill>
-              <a:schemeClr val="tx1"/>
-            </a:solidFill>
-            <a:prstDash val="sysDot"/>
-          </a:ln>
-        </p:spPr>
-        <p:style>
-          <a:lnRef idx="1">
-            <a:schemeClr val="accent1"/>
-          </a:lnRef>
-          <a:fillRef idx="0">
-            <a:schemeClr val="accent1"/>
-          </a:fillRef>
-          <a:effectRef idx="0">
-            <a:schemeClr val="accent1"/>
-          </a:effectRef>
-          <a:fontRef idx="minor">
-            <a:schemeClr val="tx1"/>
-          </a:fontRef>
-        </p:style>
-      </p:cxnSp>
-      <p:sp>
-        <p:nvSpPr>
-          <p:cNvPr id="5" name="TextBox 4"/>
-          <p:cNvSpPr txBox="1"/>
-          <p:nvPr/>
-        </p:nvSpPr>
-        <p:spPr>
-          <a:xfrm>
-            <a:off x="8593666" y="3419719"/>
-            <a:ext cx="2760134" cy="954107"/>
-          </a:xfrm>
-          <a:prstGeom prst="rect">
-            <a:avLst/>
-          </a:prstGeom>
-          <a:noFill/>
-        </p:spPr>
-        <p:txBody>
-          <a:bodyPr wrap="square" rtlCol="0">
-            <a:spAutoFit/>
-          </a:bodyPr>
-          <a:lstStyle/>
-          <a:p>
-            <a:r>
-              <a:rPr lang="en-US" sz="2800" dirty="0" err="1">
-                <a:latin typeface="Helvetica" charset="0"/>
-                <a:ea typeface="Helvetica" charset="0"/>
-                <a:cs typeface="Helvetica" charset="0"/>
-              </a:rPr>
-              <a:t>Megaflow</a:t>
-            </a:r>
-            <a:r>
-              <a:rPr lang="en-US" sz="2800" dirty="0">
-                <a:latin typeface="Helvetica" charset="0"/>
-                <a:ea typeface="Helvetica" charset="0"/>
-                <a:cs typeface="Helvetica" charset="0"/>
-              </a:rPr>
-              <a:t> cache in the kernel</a:t>
-            </a:r>
-          </a:p>
-        </p:txBody>
-      </p:sp>
-      <p:sp>
-        <p:nvSpPr>
-          <p:cNvPr id="6" name="TextBox 5"/>
-          <p:cNvSpPr txBox="1"/>
-          <p:nvPr/>
-        </p:nvSpPr>
-        <p:spPr>
-          <a:xfrm>
-            <a:off x="8593666" y="5451719"/>
-            <a:ext cx="2760134" cy="954107"/>
-          </a:xfrm>
-          <a:prstGeom prst="rect">
-            <a:avLst/>
-          </a:prstGeom>
-          <a:noFill/>
-        </p:spPr>
-        <p:txBody>
-          <a:bodyPr wrap="square" rtlCol="0">
-            <a:spAutoFit/>
-          </a:bodyPr>
-          <a:lstStyle/>
-          <a:p>
-            <a:r>
-              <a:rPr lang="en-US" sz="2800" dirty="0" err="1">
-                <a:latin typeface="Helvetica" charset="0"/>
-                <a:ea typeface="Helvetica" charset="0"/>
-                <a:cs typeface="Helvetica" charset="0"/>
-              </a:rPr>
-              <a:t>Openflow</a:t>
-            </a:r>
-            <a:r>
-              <a:rPr lang="en-US" sz="2800" dirty="0">
-                <a:latin typeface="Helvetica" charset="0"/>
-                <a:ea typeface="Helvetica" charset="0"/>
-                <a:cs typeface="Helvetica" charset="0"/>
-              </a:rPr>
-              <a:t> table in user space</a:t>
-            </a:r>
-          </a:p>
-        </p:txBody>
-      </p:sp>
-      <p:sp>
-        <p:nvSpPr>
-          <p:cNvPr id="9" name="TextBox 8"/>
-          <p:cNvSpPr txBox="1"/>
-          <p:nvPr/>
-        </p:nvSpPr>
-        <p:spPr>
-          <a:xfrm>
-            <a:off x="6913034" y="2912533"/>
-            <a:ext cx="706966" cy="523220"/>
-          </a:xfrm>
-          <a:prstGeom prst="rect">
-            <a:avLst/>
-          </a:prstGeom>
-          <a:noFill/>
-        </p:spPr>
-        <p:txBody>
-          <a:bodyPr wrap="square" rtlCol="0">
-            <a:spAutoFit/>
-          </a:bodyPr>
-          <a:lstStyle/>
-          <a:p>
-            <a:r>
-              <a:rPr lang="en-US" sz="2800" dirty="0">
-                <a:latin typeface="Helvetica" charset="0"/>
-                <a:ea typeface="Helvetica" charset="0"/>
-                <a:cs typeface="Helvetica" charset="0"/>
-              </a:rPr>
-              <a:t>Hit</a:t>
-            </a:r>
-          </a:p>
-        </p:txBody>
-      </p:sp>
-      <p:sp>
-        <p:nvSpPr>
-          <p:cNvPr id="10" name="TextBox 9"/>
-          <p:cNvSpPr txBox="1"/>
-          <p:nvPr/>
-        </p:nvSpPr>
-        <p:spPr>
-          <a:xfrm>
-            <a:off x="3491441" y="4351993"/>
-            <a:ext cx="1128185" cy="523220"/>
-          </a:xfrm>
-          <a:prstGeom prst="rect">
-            <a:avLst/>
-          </a:prstGeom>
-          <a:noFill/>
-        </p:spPr>
-        <p:txBody>
-          <a:bodyPr wrap="square" rtlCol="0">
-            <a:spAutoFit/>
-          </a:bodyPr>
-          <a:lstStyle/>
-          <a:p>
-            <a:r>
-              <a:rPr lang="en-US" sz="2800">
-                <a:latin typeface="Helvetica" charset="0"/>
-                <a:ea typeface="Helvetica" charset="0"/>
-                <a:cs typeface="Helvetica" charset="0"/>
-              </a:rPr>
-              <a:t>Miss</a:t>
-            </a:r>
-            <a:endParaRPr lang="en-US" sz="2800" dirty="0">
-              <a:latin typeface="Helvetica" charset="0"/>
-              <a:ea typeface="Helvetica" charset="0"/>
-              <a:cs typeface="Helvetica" charset="0"/>
-            </a:endParaRPr>
-          </a:p>
-        </p:txBody>
-      </p:sp>
-      <p:grpSp>
-        <p:nvGrpSpPr>
-          <p:cNvPr id="12" name="Group 11"/>
-          <p:cNvGrpSpPr/>
-          <p:nvPr/>
-        </p:nvGrpSpPr>
-        <p:grpSpPr>
-          <a:xfrm>
-            <a:off x="3352799" y="3179762"/>
-            <a:ext cx="4792134" cy="3559704"/>
-            <a:chOff x="3352799" y="3179762"/>
-            <a:chExt cx="4792134" cy="3559704"/>
-          </a:xfrm>
-        </p:grpSpPr>
-        <p:sp>
-          <p:nvSpPr>
-            <p:cNvPr id="7" name="Freeform 6"/>
-            <p:cNvSpPr/>
-            <p:nvPr/>
-          </p:nvSpPr>
-          <p:spPr>
-            <a:xfrm>
-              <a:off x="4521200" y="3437466"/>
-              <a:ext cx="2624667" cy="848023"/>
-            </a:xfrm>
-            <a:custGeom>
-              <a:avLst/>
-              <a:gdLst>
-                <a:gd name="connsiteX0" fmla="*/ 0 w 2624667"/>
-                <a:gd name="connsiteY0" fmla="*/ 0 h 848023"/>
-                <a:gd name="connsiteX1" fmla="*/ 829733 w 2624667"/>
-                <a:gd name="connsiteY1" fmla="*/ 728134 h 848023"/>
-                <a:gd name="connsiteX2" fmla="*/ 1659467 w 2624667"/>
-                <a:gd name="connsiteY2" fmla="*/ 795867 h 848023"/>
-                <a:gd name="connsiteX3" fmla="*/ 2624667 w 2624667"/>
-                <a:gd name="connsiteY3" fmla="*/ 203200 h 848023"/>
-              </a:gdLst>
-              <a:ahLst/>
-              <a:cxnLst>
-                <a:cxn ang="0">
-                  <a:pos x="connsiteX0" y="connsiteY0"/>
-                </a:cxn>
-                <a:cxn ang="0">
-                  <a:pos x="connsiteX1" y="connsiteY1"/>
-                </a:cxn>
-                <a:cxn ang="0">
-                  <a:pos x="connsiteX2" y="connsiteY2"/>
-                </a:cxn>
-                <a:cxn ang="0">
-                  <a:pos x="connsiteX3" y="connsiteY3"/>
-                </a:cxn>
-              </a:cxnLst>
-              <a:rect l="l" t="t" r="r" b="b"/>
-              <a:pathLst>
-                <a:path w="2624667" h="848023">
-                  <a:moveTo>
-                    <a:pt x="0" y="0"/>
-                  </a:moveTo>
-                  <a:cubicBezTo>
-                    <a:pt x="276577" y="297745"/>
-                    <a:pt x="553155" y="595490"/>
-                    <a:pt x="829733" y="728134"/>
-                  </a:cubicBezTo>
-                  <a:cubicBezTo>
-                    <a:pt x="1106311" y="860778"/>
-                    <a:pt x="1360311" y="883356"/>
-                    <a:pt x="1659467" y="795867"/>
-                  </a:cubicBezTo>
-                  <a:cubicBezTo>
-                    <a:pt x="1958623" y="708378"/>
-                    <a:pt x="2624667" y="203200"/>
-                    <a:pt x="2624667" y="203200"/>
-                  </a:cubicBezTo>
-                </a:path>
-              </a:pathLst>
-            </a:custGeom>
-            <a:noFill/>
-            <a:ln w="50800">
-              <a:solidFill>
-                <a:srgbClr val="C00000"/>
-              </a:solidFill>
-              <a:headEnd type="none" w="lg" len="lg"/>
-              <a:tailEnd type="triangle" w="lg" len="lg"/>
-            </a:ln>
-          </p:spPr>
-          <p:style>
-            <a:lnRef idx="2">
-              <a:schemeClr val="accent1">
-                <a:shade val="50000"/>
-              </a:schemeClr>
-            </a:lnRef>
-            <a:fillRef idx="1">
-              <a:schemeClr val="accent1"/>
-            </a:fillRef>
-            <a:effectRef idx="0">
-              <a:schemeClr val="accent1"/>
-            </a:effectRef>
-            <a:fontRef idx="minor">
-              <a:schemeClr val="lt1"/>
-            </a:fontRef>
-          </p:style>
-          <p:txBody>
-            <a:bodyPr rtlCol="0" anchor="ctr"/>
-            <a:lstStyle/>
-            <a:p>
-              <a:pPr algn="ctr"/>
-              <a:endParaRPr lang="en-US"/>
-            </a:p>
-          </p:txBody>
-        </p:sp>
-        <p:sp>
-          <p:nvSpPr>
-            <p:cNvPr id="8" name="Freeform 7"/>
-            <p:cNvSpPr/>
-            <p:nvPr/>
-          </p:nvSpPr>
-          <p:spPr>
-            <a:xfrm>
-              <a:off x="4504267" y="4064000"/>
-              <a:ext cx="3115733" cy="2153301"/>
-            </a:xfrm>
-            <a:custGeom>
-              <a:avLst/>
-              <a:gdLst>
-                <a:gd name="connsiteX0" fmla="*/ 0 w 3115733"/>
-                <a:gd name="connsiteY0" fmla="*/ 0 h 2153301"/>
-                <a:gd name="connsiteX1" fmla="*/ 677333 w 3115733"/>
-                <a:gd name="connsiteY1" fmla="*/ 1557866 h 2153301"/>
-                <a:gd name="connsiteX2" fmla="*/ 1303866 w 3115733"/>
-                <a:gd name="connsiteY2" fmla="*/ 2150533 h 2153301"/>
-                <a:gd name="connsiteX3" fmla="*/ 2032000 w 3115733"/>
-                <a:gd name="connsiteY3" fmla="*/ 1710266 h 2153301"/>
-                <a:gd name="connsiteX4" fmla="*/ 3115733 w 3115733"/>
-                <a:gd name="connsiteY4" fmla="*/ 254000 h 2153301"/>
-              </a:gdLst>
-              <a:ahLst/>
-              <a:cxnLst>
-                <a:cxn ang="0">
-                  <a:pos x="connsiteX0" y="connsiteY0"/>
-                </a:cxn>
-                <a:cxn ang="0">
-                  <a:pos x="connsiteX1" y="connsiteY1"/>
-                </a:cxn>
-                <a:cxn ang="0">
-                  <a:pos x="connsiteX2" y="connsiteY2"/>
-                </a:cxn>
-                <a:cxn ang="0">
-                  <a:pos x="connsiteX3" y="connsiteY3"/>
-                </a:cxn>
-                <a:cxn ang="0">
-                  <a:pos x="connsiteX4" y="connsiteY4"/>
-                </a:cxn>
-              </a:cxnLst>
-              <a:rect l="l" t="t" r="r" b="b"/>
-              <a:pathLst>
-                <a:path w="3115733" h="2153301">
-                  <a:moveTo>
-                    <a:pt x="0" y="0"/>
-                  </a:moveTo>
-                  <a:cubicBezTo>
-                    <a:pt x="230011" y="599722"/>
-                    <a:pt x="460022" y="1199444"/>
-                    <a:pt x="677333" y="1557866"/>
-                  </a:cubicBezTo>
-                  <a:cubicBezTo>
-                    <a:pt x="894644" y="1916288"/>
-                    <a:pt x="1078088" y="2125133"/>
-                    <a:pt x="1303866" y="2150533"/>
-                  </a:cubicBezTo>
-                  <a:cubicBezTo>
-                    <a:pt x="1529644" y="2175933"/>
-                    <a:pt x="1730022" y="2026355"/>
-                    <a:pt x="2032000" y="1710266"/>
-                  </a:cubicBezTo>
-                  <a:cubicBezTo>
-                    <a:pt x="2333978" y="1394177"/>
-                    <a:pt x="3115733" y="254000"/>
-                    <a:pt x="3115733" y="254000"/>
-                  </a:cubicBezTo>
-                </a:path>
-              </a:pathLst>
-            </a:custGeom>
-            <a:noFill/>
-            <a:ln w="50800">
-              <a:solidFill>
-                <a:srgbClr val="C00000"/>
-              </a:solidFill>
-              <a:headEnd type="none" w="lg" len="lg"/>
-              <a:tailEnd type="triangle" w="lg" len="lg"/>
-            </a:ln>
-          </p:spPr>
-          <p:style>
-            <a:lnRef idx="2">
-              <a:schemeClr val="accent1">
-                <a:shade val="50000"/>
-              </a:schemeClr>
-            </a:lnRef>
-            <a:fillRef idx="1">
-              <a:schemeClr val="accent1"/>
-            </a:fillRef>
-            <a:effectRef idx="0">
-              <a:schemeClr val="accent1"/>
-            </a:effectRef>
-            <a:fontRef idx="minor">
-              <a:schemeClr val="lt1"/>
-            </a:fontRef>
-          </p:style>
-          <p:txBody>
-            <a:bodyPr rtlCol="0" anchor="ctr"/>
-            <a:lstStyle/>
-            <a:p>
-              <a:pPr algn="ctr"/>
-              <a:endParaRPr lang="en-US"/>
-            </a:p>
-          </p:txBody>
-        </p:sp>
-        <p:sp>
-          <p:nvSpPr>
-            <p:cNvPr id="11" name="Triangle 10"/>
-            <p:cNvSpPr/>
-            <p:nvPr/>
-          </p:nvSpPr>
-          <p:spPr>
-            <a:xfrm>
-              <a:off x="3352799" y="3179762"/>
-              <a:ext cx="4792134" cy="3559704"/>
-            </a:xfrm>
-            <a:prstGeom prst="triangle">
-              <a:avLst/>
-            </a:prstGeom>
-            <a:noFill/>
-            <a:ln w="50800">
-              <a:solidFill>
-                <a:schemeClr val="tx1"/>
-              </a:solidFill>
-            </a:ln>
-          </p:spPr>
-          <p:style>
-            <a:lnRef idx="2">
-              <a:schemeClr val="accent1">
-                <a:shade val="50000"/>
-              </a:schemeClr>
-            </a:lnRef>
-            <a:fillRef idx="1">
-              <a:schemeClr val="accent1"/>
-            </a:fillRef>
-            <a:effectRef idx="0">
-              <a:schemeClr val="accent1"/>
-            </a:effectRef>
-            <a:fontRef idx="minor">
-              <a:schemeClr val="lt1"/>
-            </a:fontRef>
-          </p:style>
-          <p:txBody>
-            <a:bodyPr rtlCol="0" anchor="ctr"/>
-            <a:lstStyle/>
-            <a:p>
-              <a:pPr algn="ctr"/>
-              <a:endParaRPr lang="en-US"/>
-            </a:p>
-          </p:txBody>
-        </p:sp>
-      </p:grpSp>
-      <p:sp>
-        <p:nvSpPr>
-          <p:cNvPr id="13" name="TextBox 12"/>
-          <p:cNvSpPr txBox="1"/>
-          <p:nvPr/>
-        </p:nvSpPr>
-        <p:spPr>
-          <a:xfrm>
-            <a:off x="838198" y="3586946"/>
-            <a:ext cx="2514601" cy="954107"/>
-          </a:xfrm>
-          <a:prstGeom prst="rect">
-            <a:avLst/>
-          </a:prstGeom>
-          <a:noFill/>
-        </p:spPr>
-        <p:txBody>
-          <a:bodyPr wrap="square" rtlCol="0">
-            <a:spAutoFit/>
-          </a:bodyPr>
-          <a:lstStyle/>
-          <a:p>
-            <a:pPr algn="ctr"/>
-            <a:r>
-              <a:rPr lang="en-US" sz="2800" dirty="0">
-                <a:latin typeface="Helvetica" charset="0"/>
-                <a:ea typeface="Helvetica" charset="0"/>
-                <a:cs typeface="Helvetica" charset="0"/>
-              </a:rPr>
-              <a:t>Use tuple space search</a:t>
-            </a:r>
-          </a:p>
-        </p:txBody>
-      </p:sp>
-    </p:spTree>
-    <p:extLst>
-      <p:ext uri="{BB962C8B-B14F-4D97-AF65-F5344CB8AC3E}">
-        <p14:creationId xmlns:p14="http://schemas.microsoft.com/office/powerpoint/2010/main" val="3814795824"/>
-      </p:ext>
-    </p:extLst>
-  </p:cSld>
-  <p:clrMapOvr>
-    <a:masterClrMapping/>
-  </p:clrMapOvr>
-</p:sld>
-</file>
-
-<file path=ppt/slides/slide25.xml><?xml version="1.0" encoding="utf-8"?>
-<p:sld xmlns:a="http://schemas.openxmlformats.org/drawingml/2006/main" xmlns:r="http://schemas.openxmlformats.org/officeDocument/2006/relationships" xmlns:p="http://schemas.openxmlformats.org/presentationml/2006/main">
-  <p:cSld>
-    <p:spTree>
-      <p:nvGrpSpPr>
-        <p:cNvPr id="1" name=""/>
-        <p:cNvGrpSpPr/>
-        <p:nvPr/>
-      </p:nvGrpSpPr>
-      <p:grpSpPr>
-        <a:xfrm>
-          <a:off x="0" y="0"/>
-          <a:ext cx="0" cy="0"/>
-          <a:chOff x="0" y="0"/>
-          <a:chExt cx="0" cy="0"/>
-        </a:xfrm>
-      </p:grpSpPr>
-      <p:sp>
-        <p:nvSpPr>
-          <p:cNvPr id="2" name="Title 1">
-            <a:extLst>
-              <a:ext uri="{FF2B5EF4-FFF2-40B4-BE49-F238E27FC236}">
-                <a16:creationId xmlns:a16="http://schemas.microsoft.com/office/drawing/2014/main" id="{BAA7E1EE-9119-2C4C-A3C8-A551085DC14E}"/>
-              </a:ext>
-            </a:extLst>
-          </p:cNvPr>
-          <p:cNvSpPr>
-            <a:spLocks noGrp="1"/>
-          </p:cNvSpPr>
-          <p:nvPr>
-            <p:ph type="title"/>
-          </p:nvPr>
-        </p:nvSpPr>
-        <p:spPr/>
-        <p:txBody>
-          <a:bodyPr/>
-          <a:lstStyle/>
-          <a:p>
-            <a:r>
-              <a:rPr lang="en-US" dirty="0"/>
-              <a:t>Outlook: fast packet processing</a:t>
-            </a:r>
-          </a:p>
-        </p:txBody>
-      </p:sp>
-      <p:sp>
-        <p:nvSpPr>
-          <p:cNvPr id="3" name="Content Placeholder 2">
-            <a:extLst>
-              <a:ext uri="{FF2B5EF4-FFF2-40B4-BE49-F238E27FC236}">
-                <a16:creationId xmlns:a16="http://schemas.microsoft.com/office/drawing/2014/main" id="{7EFD0E75-E9A7-1742-A38C-F232C5038582}"/>
-              </a:ext>
-            </a:extLst>
-          </p:cNvPr>
-          <p:cNvSpPr>
-            <a:spLocks noGrp="1"/>
-          </p:cNvSpPr>
-          <p:nvPr>
-            <p:ph idx="1"/>
-          </p:nvPr>
-        </p:nvSpPr>
-        <p:spPr>
-          <a:xfrm>
-            <a:off x="838200" y="1825625"/>
-            <a:ext cx="10515600" cy="4785382"/>
-          </a:xfrm>
-        </p:spPr>
-        <p:txBody>
-          <a:bodyPr>
-            <a:normAutofit/>
-          </a:bodyPr>
-          <a:lstStyle/>
-          <a:p>
-            <a:r>
-              <a:rPr lang="en-US" dirty="0">
-                <a:solidFill>
-                  <a:srgbClr val="C00000"/>
-                </a:solidFill>
-              </a:rPr>
-              <a:t>Get rid of needless software if you can</a:t>
-            </a:r>
-          </a:p>
-          <a:p>
-            <a:r>
-              <a:rPr lang="en-US" dirty="0"/>
-              <a:t>Specialization to app can bring significant benefits</a:t>
-            </a:r>
-          </a:p>
-          <a:p>
-            <a:pPr lvl="1"/>
-            <a:r>
-              <a:rPr lang="en-US" dirty="0"/>
-              <a:t>IDS (</a:t>
-            </a:r>
-            <a:r>
-              <a:rPr lang="en-US" dirty="0" err="1"/>
-              <a:t>hyperscan</a:t>
-            </a:r>
-            <a:r>
-              <a:rPr lang="en-US" dirty="0"/>
-              <a:t>), caching in switches &amp; load balancers</a:t>
-            </a:r>
-          </a:p>
-          <a:p>
-            <a:pPr lvl="1"/>
-            <a:r>
-              <a:rPr lang="en-US" dirty="0"/>
-              <a:t>Algorithms can be as important as the frameworks</a:t>
-            </a:r>
-          </a:p>
-          <a:p>
-            <a:r>
-              <a:rPr lang="en-US" dirty="0"/>
-              <a:t>Software changes</a:t>
-            </a:r>
-          </a:p>
-          <a:p>
-            <a:pPr lvl="1"/>
-            <a:r>
-              <a:rPr lang="en-US" dirty="0"/>
-              <a:t>Application-kernel interface: application must be modified</a:t>
-            </a:r>
-          </a:p>
-          <a:p>
-            <a:pPr lvl="1"/>
-            <a:r>
-              <a:rPr lang="en-US" dirty="0"/>
-              <a:t>Device drivers must often be modified</a:t>
-            </a:r>
-          </a:p>
-          <a:p>
-            <a:r>
-              <a:rPr lang="en-US" dirty="0"/>
-              <a:t>Multitenancy: think about implications to weakening fault isolation</a:t>
-            </a:r>
-          </a:p>
-          <a:p>
-            <a:r>
-              <a:rPr lang="en-US" dirty="0">
-                <a:solidFill>
-                  <a:srgbClr val="C00000"/>
-                </a:solidFill>
-              </a:rPr>
-              <a:t>Can we get isolation with efficiency?</a:t>
-            </a:r>
-          </a:p>
-        </p:txBody>
-      </p:sp>
-    </p:spTree>
-    <p:extLst>
-      <p:ext uri="{BB962C8B-B14F-4D97-AF65-F5344CB8AC3E}">
-        <p14:creationId xmlns:p14="http://schemas.microsoft.com/office/powerpoint/2010/main" val="3150246287"/>
-      </p:ext>
-    </p:extLst>
-  </p:cSld>
-  <p:clrMapOvr>
-    <a:masterClrMapping/>
-  </p:clrMapOvr>
-  <p:timing>
-    <p:tnLst>
-      <p:par>
-        <p:cTn id="1" dur="indefinite" restart="never" nodeType="tmRoot">
-          <p:childTnLst>
-            <p:seq concurrent="1" nextAc="seek">
-              <p:cTn id="2" dur="indefinite" nodeType="mainSeq">
-                <p:childTnLst>
-                  <p:par>
-                    <p:cTn id="3" fill="hold">
-                      <p:stCondLst>
-                        <p:cond delay="indefinite"/>
-                      </p:stCondLst>
-                      <p:childTnLst>
-                        <p:par>
-                          <p:cTn id="4" fill="hold">
-                            <p:stCondLst>
-                              <p:cond delay="0"/>
-                            </p:stCondLst>
-                            <p:childTnLst>
-                              <p:par>
-                                <p:cTn id="5" presetID="1" presetClass="entr" presetSubtype="0" fill="hold" nodeType="clickEffect">
-                                  <p:stCondLst>
-                                    <p:cond delay="0"/>
-                                  </p:stCondLst>
-                                  <p:childTnLst>
-                                    <p:set>
-                                      <p:cBhvr>
-                                        <p:cTn id="6" dur="1" fill="hold">
-                                          <p:stCondLst>
-                                            <p:cond delay="0"/>
-                                          </p:stCondLst>
-                                        </p:cTn>
-                                        <p:tgtEl>
-                                          <p:spTgt spid="3">
-                                            <p:txEl>
-                                              <p:pRg st="0" end="0"/>
-                                            </p:txEl>
-                                          </p:spTgt>
-                                        </p:tgtEl>
-                                        <p:attrNameLst>
-                                          <p:attrName>style.visibility</p:attrName>
-                                        </p:attrNameLst>
-                                      </p:cBhvr>
-                                      <p:to>
-                                        <p:strVal val="visible"/>
-                                      </p:to>
-                                    </p:set>
-                                  </p:childTnLst>
-                                </p:cTn>
-                              </p:par>
-                            </p:childTnLst>
-                          </p:cTn>
-                        </p:par>
-                      </p:childTnLst>
-                    </p:cTn>
-                  </p:par>
-                  <p:par>
-                    <p:cTn id="7" fill="hold">
-                      <p:stCondLst>
-                        <p:cond delay="indefinite"/>
-                      </p:stCondLst>
-                      <p:childTnLst>
-                        <p:par>
-                          <p:cTn id="8" fill="hold">
-                            <p:stCondLst>
-                              <p:cond delay="0"/>
-                            </p:stCondLst>
-                            <p:childTnLst>
-                              <p:par>
-                                <p:cTn id="9" presetID="1" presetClass="entr" presetSubtype="0" fill="hold" nodeType="clickEffect">
-                                  <p:stCondLst>
-                                    <p:cond delay="0"/>
-                                  </p:stCondLst>
-                                  <p:childTnLst>
-                                    <p:set>
-                                      <p:cBhvr>
-                                        <p:cTn id="10" dur="1" fill="hold">
-                                          <p:stCondLst>
-                                            <p:cond delay="0"/>
-                                          </p:stCondLst>
-                                        </p:cTn>
-                                        <p:tgtEl>
-                                          <p:spTgt spid="3">
-                                            <p:txEl>
-                                              <p:pRg st="1" end="1"/>
-                                            </p:txEl>
-                                          </p:spTgt>
-                                        </p:tgtEl>
-                                        <p:attrNameLst>
-                                          <p:attrName>style.visibility</p:attrName>
-                                        </p:attrNameLst>
-                                      </p:cBhvr>
-                                      <p:to>
-                                        <p:strVal val="visible"/>
-                                      </p:to>
-                                    </p:set>
-                                  </p:childTnLst>
-                                </p:cTn>
-                              </p:par>
-                            </p:childTnLst>
-                          </p:cTn>
-                        </p:par>
-                      </p:childTnLst>
-                    </p:cTn>
-                  </p:par>
-                  <p:par>
-                    <p:cTn id="11" fill="hold">
-                      <p:stCondLst>
-                        <p:cond delay="indefinite"/>
-                      </p:stCondLst>
-                      <p:childTnLst>
-                        <p:par>
-                          <p:cTn id="12" fill="hold">
-                            <p:stCondLst>
-                              <p:cond delay="0"/>
-                            </p:stCondLst>
-                            <p:childTnLst>
-                              <p:par>
-                                <p:cTn id="13" presetID="1" presetClass="entr" presetSubtype="0" fill="hold" nodeType="clickEffect">
-                                  <p:stCondLst>
-                                    <p:cond delay="0"/>
-                                  </p:stCondLst>
-                                  <p:childTnLst>
-                                    <p:set>
-                                      <p:cBhvr>
-                                        <p:cTn id="14" dur="1" fill="hold">
-                                          <p:stCondLst>
-                                            <p:cond delay="0"/>
-                                          </p:stCondLst>
-                                        </p:cTn>
-                                        <p:tgtEl>
-                                          <p:spTgt spid="3">
-                                            <p:txEl>
-                                              <p:pRg st="2" end="2"/>
-                                            </p:txEl>
-                                          </p:spTgt>
-                                        </p:tgtEl>
-                                        <p:attrNameLst>
-                                          <p:attrName>style.visibility</p:attrName>
-                                        </p:attrNameLst>
-                                      </p:cBhvr>
-                                      <p:to>
-                                        <p:strVal val="visible"/>
-                                      </p:to>
-                                    </p:set>
-                                  </p:childTnLst>
-                                </p:cTn>
-                              </p:par>
-                            </p:childTnLst>
-                          </p:cTn>
-                        </p:par>
-                      </p:childTnLst>
-                    </p:cTn>
-                  </p:par>
-                  <p:par>
-                    <p:cTn id="15" fill="hold">
-                      <p:stCondLst>
-                        <p:cond delay="indefinite"/>
-                      </p:stCondLst>
-                      <p:childTnLst>
-                        <p:par>
-                          <p:cTn id="16" fill="hold">
-                            <p:stCondLst>
-                              <p:cond delay="0"/>
-                            </p:stCondLst>
-                            <p:childTnLst>
-                              <p:par>
-                                <p:cTn id="17" presetID="1" presetClass="entr" presetSubtype="0" fill="hold" nodeType="clickEffect">
-                                  <p:stCondLst>
-                                    <p:cond delay="0"/>
-                                  </p:stCondLst>
-                                  <p:childTnLst>
-                                    <p:set>
-                                      <p:cBhvr>
-                                        <p:cTn id="18" dur="1" fill="hold">
-                                          <p:stCondLst>
-                                            <p:cond delay="0"/>
-                                          </p:stCondLst>
-                                        </p:cTn>
-                                        <p:tgtEl>
-                                          <p:spTgt spid="3">
-                                            <p:txEl>
-                                              <p:pRg st="3" end="3"/>
-                                            </p:txEl>
-                                          </p:spTgt>
-                                        </p:tgtEl>
-                                        <p:attrNameLst>
-                                          <p:attrName>style.visibility</p:attrName>
-                                        </p:attrNameLst>
-                                      </p:cBhvr>
-                                      <p:to>
-                                        <p:strVal val="visible"/>
-                                      </p:to>
-                                    </p:set>
-                                  </p:childTnLst>
-                                </p:cTn>
-                              </p:par>
-                            </p:childTnLst>
-                          </p:cTn>
-                        </p:par>
-                      </p:childTnLst>
-                    </p:cTn>
-                  </p:par>
-                  <p:par>
-                    <p:cTn id="19" fill="hold">
-                      <p:stCondLst>
-                        <p:cond delay="indefinite"/>
-                      </p:stCondLst>
-                      <p:childTnLst>
-                        <p:par>
-                          <p:cTn id="20" fill="hold">
-                            <p:stCondLst>
-                              <p:cond delay="0"/>
-                            </p:stCondLst>
-                            <p:childTnLst>
-                              <p:par>
-                                <p:cTn id="21" presetID="1" presetClass="entr" presetSubtype="0" fill="hold" nodeType="clickEffect">
-                                  <p:stCondLst>
-                                    <p:cond delay="0"/>
-                                  </p:stCondLst>
-                                  <p:childTnLst>
-                                    <p:set>
-                                      <p:cBhvr>
-                                        <p:cTn id="22" dur="1" fill="hold">
-                                          <p:stCondLst>
-                                            <p:cond delay="0"/>
-                                          </p:stCondLst>
-                                        </p:cTn>
-                                        <p:tgtEl>
-                                          <p:spTgt spid="3">
-                                            <p:txEl>
-                                              <p:pRg st="4" end="4"/>
-                                            </p:txEl>
-                                          </p:spTgt>
-                                        </p:tgtEl>
-                                        <p:attrNameLst>
-                                          <p:attrName>style.visibility</p:attrName>
-                                        </p:attrNameLst>
-                                      </p:cBhvr>
-                                      <p:to>
-                                        <p:strVal val="visible"/>
-                                      </p:to>
-                                    </p:set>
-                                  </p:childTnLst>
-                                </p:cTn>
-                              </p:par>
-                            </p:childTnLst>
-                          </p:cTn>
-                        </p:par>
-                      </p:childTnLst>
-                    </p:cTn>
-                  </p:par>
-                  <p:par>
-                    <p:cTn id="23" fill="hold">
-                      <p:stCondLst>
-                        <p:cond delay="indefinite"/>
-                      </p:stCondLst>
-                      <p:childTnLst>
-                        <p:par>
-                          <p:cTn id="24" fill="hold">
-                            <p:stCondLst>
-                              <p:cond delay="0"/>
-                            </p:stCondLst>
-                            <p:childTnLst>
-                              <p:par>
-                                <p:cTn id="25" presetID="1" presetClass="entr" presetSubtype="0" fill="hold" nodeType="clickEffect">
-                                  <p:stCondLst>
-                                    <p:cond delay="0"/>
-                                  </p:stCondLst>
-                                  <p:childTnLst>
-                                    <p:set>
-                                      <p:cBhvr>
-                                        <p:cTn id="26" dur="1" fill="hold">
-                                          <p:stCondLst>
-                                            <p:cond delay="0"/>
-                                          </p:stCondLst>
-                                        </p:cTn>
-                                        <p:tgtEl>
-                                          <p:spTgt spid="3">
-                                            <p:txEl>
-                                              <p:pRg st="5" end="5"/>
-                                            </p:txEl>
-                                          </p:spTgt>
-                                        </p:tgtEl>
-                                        <p:attrNameLst>
-                                          <p:attrName>style.visibility</p:attrName>
-                                        </p:attrNameLst>
-                                      </p:cBhvr>
-                                      <p:to>
-                                        <p:strVal val="visible"/>
-                                      </p:to>
-                                    </p:set>
-                                  </p:childTnLst>
-                                </p:cTn>
-                              </p:par>
-                            </p:childTnLst>
-                          </p:cTn>
-                        </p:par>
-                      </p:childTnLst>
-                    </p:cTn>
-                  </p:par>
-                  <p:par>
-                    <p:cTn id="27" fill="hold">
-                      <p:stCondLst>
-                        <p:cond delay="indefinite"/>
-                      </p:stCondLst>
-                      <p:childTnLst>
-                        <p:par>
-                          <p:cTn id="28" fill="hold">
-                            <p:stCondLst>
-                              <p:cond delay="0"/>
-                            </p:stCondLst>
-                            <p:childTnLst>
-                              <p:par>
-                                <p:cTn id="29" presetID="1" presetClass="entr" presetSubtype="0" fill="hold" nodeType="clickEffect">
-                                  <p:stCondLst>
-                                    <p:cond delay="0"/>
-                                  </p:stCondLst>
-                                  <p:childTnLst>
-                                    <p:set>
-                                      <p:cBhvr>
-                                        <p:cTn id="30" dur="1" fill="hold">
-                                          <p:stCondLst>
-                                            <p:cond delay="0"/>
-                                          </p:stCondLst>
-                                        </p:cTn>
-                                        <p:tgtEl>
-                                          <p:spTgt spid="3">
-                                            <p:txEl>
-                                              <p:pRg st="6" end="6"/>
-                                            </p:txEl>
-                                          </p:spTgt>
-                                        </p:tgtEl>
-                                        <p:attrNameLst>
-                                          <p:attrName>style.visibility</p:attrName>
-                                        </p:attrNameLst>
-                                      </p:cBhvr>
-                                      <p:to>
-                                        <p:strVal val="visible"/>
-                                      </p:to>
-                                    </p:set>
-                                  </p:childTnLst>
-                                </p:cTn>
-                              </p:par>
-                            </p:childTnLst>
-                          </p:cTn>
-                        </p:par>
-                      </p:childTnLst>
-                    </p:cTn>
-                  </p:par>
-                  <p:par>
-                    <p:cTn id="31" fill="hold">
-                      <p:stCondLst>
-                        <p:cond delay="indefinite"/>
-                      </p:stCondLst>
-                      <p:childTnLst>
-                        <p:par>
-                          <p:cTn id="32" fill="hold">
-                            <p:stCondLst>
-                              <p:cond delay="0"/>
-                            </p:stCondLst>
-                            <p:childTnLst>
-                              <p:par>
-                                <p:cTn id="33" presetID="1" presetClass="entr" presetSubtype="0" fill="hold" nodeType="clickEffect">
-                                  <p:stCondLst>
-                                    <p:cond delay="0"/>
-                                  </p:stCondLst>
-                                  <p:childTnLst>
-                                    <p:set>
-                                      <p:cBhvr>
-                                        <p:cTn id="34" dur="1" fill="hold">
-                                          <p:stCondLst>
-                                            <p:cond delay="0"/>
-                                          </p:stCondLst>
-                                        </p:cTn>
-                                        <p:tgtEl>
-                                          <p:spTgt spid="3">
-                                            <p:txEl>
-                                              <p:pRg st="7" end="7"/>
-                                            </p:txEl>
-                                          </p:spTgt>
-                                        </p:tgtEl>
-                                        <p:attrNameLst>
-                                          <p:attrName>style.visibility</p:attrName>
-                                        </p:attrNameLst>
-                                      </p:cBhvr>
-                                      <p:to>
-                                        <p:strVal val="visible"/>
-                                      </p:to>
-                                    </p:set>
-                                  </p:childTnLst>
-                                </p:cTn>
-                              </p:par>
-                            </p:childTnLst>
-                          </p:cTn>
-                        </p:par>
-                      </p:childTnLst>
-                    </p:cTn>
-                  </p:par>
-                  <p:par>
-                    <p:cTn id="35" fill="hold">
-                      <p:stCondLst>
-                        <p:cond delay="indefinite"/>
-                      </p:stCondLst>
-                      <p:childTnLst>
-                        <p:par>
-                          <p:cTn id="36" fill="hold">
-                            <p:stCondLst>
-                              <p:cond delay="0"/>
-                            </p:stCondLst>
-                            <p:childTnLst>
-                              <p:par>
-                                <p:cTn id="37" presetID="1" presetClass="entr" presetSubtype="0" fill="hold" nodeType="clickEffect">
-                                  <p:stCondLst>
-                                    <p:cond delay="0"/>
-                                  </p:stCondLst>
-                                  <p:childTnLst>
-                                    <p:set>
-                                      <p:cBhvr>
-                                        <p:cTn id="38" dur="1" fill="hold">
-                                          <p:stCondLst>
-                                            <p:cond delay="0"/>
-                                          </p:stCondLst>
-                                        </p:cTn>
-                                        <p:tgtEl>
-                                          <p:spTgt spid="3">
-                                            <p:txEl>
-                                              <p:pRg st="8" end="8"/>
-                                            </p:txEl>
-                                          </p:spTgt>
-                                        </p:tgtEl>
-                                        <p:attrNameLst>
-                                          <p:attrName>style.visibility</p:attrName>
-                                        </p:attrNameLst>
-                                      </p:cBhvr>
-                                      <p:to>
-                                        <p:strVal val="visible"/>
-                                      </p:to>
-                                    </p:set>
-                                  </p:childTnLst>
-                                </p:cTn>
-                              </p:par>
-                            </p:childTnLst>
-                          </p:cTn>
-                        </p:par>
-                      </p:childTnLst>
-                    </p:cTn>
-                  </p:par>
-                </p:childTnLst>
-              </p:cTn>
-              <p:prevCondLst>
-                <p:cond evt="onPrev" delay="0">
-                  <p:tgtEl>
-                    <p:sldTgt/>
-                  </p:tgtEl>
-                </p:cond>
-              </p:prevCondLst>
-              <p:nextCondLst>
-                <p:cond evt="onNext" delay="0">
-                  <p:tgtEl>
-                    <p:sldTgt/>
-                  </p:tgtEl>
-                </p:cond>
-              </p:nextCondLst>
-            </p:seq>
-          </p:childTnLst>
-        </p:cTn>
-      </p:par>
-    </p:tnLst>
-  </p:timing>
-</p:sld>
-</file>
-
-<file path=ppt/slides/slide26.xml><?xml version="1.0" encoding="utf-8"?>
-<p:sld xmlns:a="http://schemas.openxmlformats.org/drawingml/2006/main" xmlns:r="http://schemas.openxmlformats.org/officeDocument/2006/relationships" xmlns:p="http://schemas.openxmlformats.org/presentationml/2006/main">
-  <p:cSld>
-    <p:spTree>
-      <p:nvGrpSpPr>
-        <p:cNvPr id="1" name=""/>
-        <p:cNvGrpSpPr/>
-        <p:nvPr/>
-      </p:nvGrpSpPr>
-      <p:grpSpPr>
-        <a:xfrm>
-          <a:off x="0" y="0"/>
-          <a:ext cx="0" cy="0"/>
-          <a:chOff x="0" y="0"/>
-          <a:chExt cx="0" cy="0"/>
-        </a:xfrm>
-      </p:grpSpPr>
-      <p:sp>
-        <p:nvSpPr>
-          <p:cNvPr id="2" name="Title 1">
-            <a:extLst>
-              <a:ext uri="{FF2B5EF4-FFF2-40B4-BE49-F238E27FC236}">
-                <a16:creationId xmlns:a16="http://schemas.microsoft.com/office/drawing/2014/main" id="{092EE2D6-8DE0-030E-4F52-E7C5646EF5DD}"/>
-              </a:ext>
-            </a:extLst>
-          </p:cNvPr>
-          <p:cNvSpPr>
-            <a:spLocks noGrp="1"/>
-          </p:cNvSpPr>
-          <p:nvPr>
-            <p:ph type="title"/>
-          </p:nvPr>
-        </p:nvSpPr>
-        <p:spPr/>
-        <p:txBody>
-          <a:bodyPr>
-            <a:normAutofit/>
-          </a:bodyPr>
-          <a:lstStyle/>
-          <a:p>
-            <a:r>
-              <a:rPr lang="en-US" dirty="0"/>
-              <a:t>Going beyond one (software) box</a:t>
-            </a:r>
-          </a:p>
-        </p:txBody>
-      </p:sp>
-      <p:sp>
-        <p:nvSpPr>
-          <p:cNvPr id="3" name="Content Placeholder 2">
-            <a:extLst>
-              <a:ext uri="{FF2B5EF4-FFF2-40B4-BE49-F238E27FC236}">
-                <a16:creationId xmlns:a16="http://schemas.microsoft.com/office/drawing/2014/main" id="{EA70903D-878E-AD93-EA95-938B24D16969}"/>
-              </a:ext>
-            </a:extLst>
-          </p:cNvPr>
-          <p:cNvSpPr>
-            <a:spLocks noGrp="1"/>
-          </p:cNvSpPr>
-          <p:nvPr>
-            <p:ph idx="1"/>
-          </p:nvPr>
-        </p:nvSpPr>
-        <p:spPr/>
-        <p:txBody>
-          <a:bodyPr/>
-          <a:lstStyle/>
-          <a:p>
-            <a:r>
-              <a:rPr lang="en-US" dirty="0"/>
-              <a:t>Safe &amp; efficient composition of middleboxes</a:t>
-            </a:r>
-          </a:p>
-          <a:p>
-            <a:pPr lvl="1"/>
-            <a:endParaRPr lang="en-US" dirty="0"/>
-          </a:p>
-          <a:p>
-            <a:r>
-              <a:rPr lang="en-US" dirty="0"/>
-              <a:t>Share or shard state</a:t>
-            </a:r>
-          </a:p>
-          <a:p>
-            <a:r>
-              <a:rPr lang="en-US" dirty="0"/>
-              <a:t>Failover and migration</a:t>
-            </a:r>
-          </a:p>
-          <a:p>
-            <a:r>
-              <a:rPr lang="en-US" dirty="0"/>
-              <a:t>Placement and routing</a:t>
-            </a:r>
-          </a:p>
-          <a:p>
-            <a:r>
-              <a:rPr lang="en-US" dirty="0"/>
-              <a:t>Scaling and compaction</a:t>
-            </a:r>
-          </a:p>
-          <a:p>
-            <a:endParaRPr lang="en-US" dirty="0"/>
-          </a:p>
-        </p:txBody>
-      </p:sp>
-    </p:spTree>
-    <p:extLst>
-      <p:ext uri="{BB962C8B-B14F-4D97-AF65-F5344CB8AC3E}">
-        <p14:creationId xmlns:p14="http://schemas.microsoft.com/office/powerpoint/2010/main" val="116008247"/>
-      </p:ext>
-    </p:extLst>
-  </p:cSld>
-  <p:clrMapOvr>
-    <a:masterClrMapping/>
-  </p:clrMapOvr>
-  <p:timing>
-    <p:tnLst>
-      <p:par>
-        <p:cTn id="1" dur="indefinite" restart="never" nodeType="tmRoot">
-          <p:childTnLst>
-            <p:seq concurrent="1" nextAc="seek">
-              <p:cTn id="2" dur="indefinite" nodeType="mainSeq">
-                <p:childTnLst>
-                  <p:par>
-                    <p:cTn id="3" fill="hold">
-                      <p:stCondLst>
-                        <p:cond delay="indefinite"/>
-                      </p:stCondLst>
-                      <p:childTnLst>
-                        <p:par>
-                          <p:cTn id="4" fill="hold">
-                            <p:stCondLst>
-                              <p:cond delay="0"/>
-                            </p:stCondLst>
-                            <p:childTnLst>
-                              <p:par>
-                                <p:cTn id="5" presetID="1" presetClass="entr" presetSubtype="0" fill="hold" nodeType="clickEffect">
-                                  <p:stCondLst>
-                                    <p:cond delay="0"/>
-                                  </p:stCondLst>
-                                  <p:childTnLst>
-                                    <p:set>
-                                      <p:cBhvr>
-                                        <p:cTn id="6" dur="1" fill="hold">
-                                          <p:stCondLst>
-                                            <p:cond delay="0"/>
-                                          </p:stCondLst>
-                                        </p:cTn>
-                                        <p:tgtEl>
-                                          <p:spTgt spid="3">
-                                            <p:txEl>
-                                              <p:pRg st="2" end="2"/>
-                                            </p:txEl>
-                                          </p:spTgt>
-                                        </p:tgtEl>
-                                        <p:attrNameLst>
-                                          <p:attrName>style.visibility</p:attrName>
-                                        </p:attrNameLst>
-                                      </p:cBhvr>
-                                      <p:to>
-                                        <p:strVal val="visible"/>
-                                      </p:to>
-                                    </p:set>
-                                  </p:childTnLst>
-                                </p:cTn>
-                              </p:par>
-                            </p:childTnLst>
-                          </p:cTn>
-                        </p:par>
-                      </p:childTnLst>
-                    </p:cTn>
-                  </p:par>
-                  <p:par>
-                    <p:cTn id="7" fill="hold">
-                      <p:stCondLst>
-                        <p:cond delay="indefinite"/>
-                      </p:stCondLst>
-                      <p:childTnLst>
-                        <p:par>
-                          <p:cTn id="8" fill="hold">
-                            <p:stCondLst>
-                              <p:cond delay="0"/>
-                            </p:stCondLst>
-                            <p:childTnLst>
-                              <p:par>
-                                <p:cTn id="9" presetID="1" presetClass="entr" presetSubtype="0" fill="hold" nodeType="clickEffect">
-                                  <p:stCondLst>
-                                    <p:cond delay="0"/>
-                                  </p:stCondLst>
-                                  <p:childTnLst>
-                                    <p:set>
-                                      <p:cBhvr>
-                                        <p:cTn id="10" dur="1" fill="hold">
-                                          <p:stCondLst>
-                                            <p:cond delay="0"/>
-                                          </p:stCondLst>
-                                        </p:cTn>
-                                        <p:tgtEl>
-                                          <p:spTgt spid="3">
-                                            <p:txEl>
-                                              <p:pRg st="3" end="3"/>
-                                            </p:txEl>
-                                          </p:spTgt>
-                                        </p:tgtEl>
-                                        <p:attrNameLst>
-                                          <p:attrName>style.visibility</p:attrName>
-                                        </p:attrNameLst>
-                                      </p:cBhvr>
-                                      <p:to>
-                                        <p:strVal val="visible"/>
-                                      </p:to>
-                                    </p:set>
-                                  </p:childTnLst>
-                                </p:cTn>
-                              </p:par>
-                            </p:childTnLst>
-                          </p:cTn>
-                        </p:par>
-                      </p:childTnLst>
-                    </p:cTn>
-                  </p:par>
-                  <p:par>
-                    <p:cTn id="11" fill="hold">
-                      <p:stCondLst>
-                        <p:cond delay="indefinite"/>
-                      </p:stCondLst>
-                      <p:childTnLst>
-                        <p:par>
-                          <p:cTn id="12" fill="hold">
-                            <p:stCondLst>
-                              <p:cond delay="0"/>
-                            </p:stCondLst>
-                            <p:childTnLst>
-                              <p:par>
-                                <p:cTn id="13" presetID="1" presetClass="entr" presetSubtype="0" fill="hold" nodeType="clickEffect">
-                                  <p:stCondLst>
-                                    <p:cond delay="0"/>
-                                  </p:stCondLst>
-                                  <p:childTnLst>
-                                    <p:set>
-                                      <p:cBhvr>
-                                        <p:cTn id="14" dur="1" fill="hold">
-                                          <p:stCondLst>
-                                            <p:cond delay="0"/>
-                                          </p:stCondLst>
-                                        </p:cTn>
-                                        <p:tgtEl>
-                                          <p:spTgt spid="3">
-                                            <p:txEl>
-                                              <p:pRg st="4" end="4"/>
-                                            </p:txEl>
-                                          </p:spTgt>
-                                        </p:tgtEl>
-                                        <p:attrNameLst>
-                                          <p:attrName>style.visibility</p:attrName>
-                                        </p:attrNameLst>
-                                      </p:cBhvr>
-                                      <p:to>
-                                        <p:strVal val="visible"/>
-                                      </p:to>
-                                    </p:set>
-                                  </p:childTnLst>
-                                </p:cTn>
-                              </p:par>
-                            </p:childTnLst>
-                          </p:cTn>
-                        </p:par>
-                      </p:childTnLst>
-                    </p:cTn>
-                  </p:par>
-                  <p:par>
-                    <p:cTn id="15" fill="hold">
-                      <p:stCondLst>
-                        <p:cond delay="indefinite"/>
-                      </p:stCondLst>
-                      <p:childTnLst>
-                        <p:par>
-                          <p:cTn id="16" fill="hold">
-                            <p:stCondLst>
-                              <p:cond delay="0"/>
-                            </p:stCondLst>
-                            <p:childTnLst>
-                              <p:par>
-                                <p:cTn id="17" presetID="1" presetClass="entr" presetSubtype="0" fill="hold" nodeType="clickEffect">
-                                  <p:stCondLst>
-                                    <p:cond delay="0"/>
-                                  </p:stCondLst>
-                                  <p:childTnLst>
-                                    <p:set>
-                                      <p:cBhvr>
-                                        <p:cTn id="18" dur="1" fill="hold">
-                                          <p:stCondLst>
-                                            <p:cond delay="0"/>
-                                          </p:stCondLst>
-                                        </p:cTn>
-                                        <p:tgtEl>
-                                          <p:spTgt spid="3">
-                                            <p:txEl>
-                                              <p:pRg st="5" end="5"/>
-                                            </p:txEl>
-                                          </p:spTgt>
-                                        </p:tgtEl>
-                                        <p:attrNameLst>
-                                          <p:attrName>style.visibility</p:attrName>
-                                        </p:attrNameLst>
-                                      </p:cBhvr>
-                                      <p:to>
-                                        <p:strVal val="visible"/>
-                                      </p:to>
-                                    </p:set>
-                                  </p:childTnLst>
-                                </p:cTn>
-                              </p:par>
-                            </p:childTnLst>
-                          </p:cTn>
-                        </p:par>
-                      </p:childTnLst>
-                    </p:cTn>
-                  </p:par>
-                </p:childTnLst>
-              </p:cTn>
-              <p:prevCondLst>
-                <p:cond evt="onPrev" delay="0">
-                  <p:tgtEl>
-                    <p:sldTgt/>
-                  </p:tgtEl>
-                </p:cond>
-              </p:prevCondLst>
-              <p:nextCondLst>
-                <p:cond evt="onNext" delay="0">
-                  <p:tgtEl>
-                    <p:sldTgt/>
-                  </p:tgtEl>
-                </p:cond>
-              </p:nextCondLst>
-            </p:seq>
-          </p:childTnLst>
-        </p:cTn>
-      </p:par>
-    </p:tnLst>
   </p:timing>
 </p:sld>
 </file>

</xml_diff>